<commit_message>
Added better health and weapon icons with consistent sizes, placements and dimensions. Angled the rocket down a bit to stop it going over vehicles.
</commit_message>
<xml_diff>
--- a/assets/display/icons/icons.pptx
+++ b/assets/display/icons/icons.pptx
@@ -2977,10 +2977,10 @@
       </p:grpSpPr>
       <p:grpSp>
         <p:nvGrpSpPr>
-          <p:cNvPr id="39" name="Group 38">
+          <p:cNvPr id="9" name="Group 8">
             <a:extLst>
               <a:ext uri="{FF2B5EF4-FFF2-40B4-BE49-F238E27FC236}">
-                <a16:creationId xmlns:a16="http://schemas.microsoft.com/office/drawing/2014/main" id="{4F4DD76A-382E-46D9-A840-1AA73730AA44}"/>
+                <a16:creationId xmlns:a16="http://schemas.microsoft.com/office/drawing/2014/main" id="{393EA8FC-A438-4DAD-A577-E7AE83AB2F63}"/>
               </a:ext>
             </a:extLst>
           </p:cNvPr>
@@ -2989,23 +2989,18 @@
         </p:nvGrpSpPr>
         <p:grpSpPr>
           <a:xfrm>
-            <a:off x="-1285588" y="-157438"/>
-            <a:ext cx="2679234" cy="2115100"/>
-            <a:chOff x="1354668" y="131232"/>
-            <a:chExt cx="10185398" cy="6595535"/>
+            <a:off x="154379" y="154327"/>
+            <a:ext cx="1491466" cy="1567474"/>
+            <a:chOff x="154379" y="154327"/>
+            <a:chExt cx="1491466" cy="1567474"/>
           </a:xfrm>
-          <a:effectLst>
-            <a:glow rad="635000">
-              <a:schemeClr val="bg1"/>
-            </a:glow>
-          </a:effectLst>
         </p:grpSpPr>
         <p:sp>
           <p:nvSpPr>
-            <p:cNvPr id="4" name="Rectangle 3">
+            <p:cNvPr id="2" name="Rectangle 1">
               <a:extLst>
                 <a:ext uri="{FF2B5EF4-FFF2-40B4-BE49-F238E27FC236}">
-                  <a16:creationId xmlns:a16="http://schemas.microsoft.com/office/drawing/2014/main" id="{ED4C6AF5-E0CD-4909-A091-D24C7B5ADFEC}"/>
+                  <a16:creationId xmlns:a16="http://schemas.microsoft.com/office/drawing/2014/main" id="{EDA52ACA-6D24-4AED-89E1-130423820807}"/>
                 </a:ext>
               </a:extLst>
             </p:cNvPr>
@@ -3014,8 +3009,8 @@
           </p:nvSpPr>
           <p:spPr>
             <a:xfrm>
-              <a:off x="1354668" y="2230967"/>
-              <a:ext cx="7662332" cy="2396067"/>
+              <a:off x="154379" y="154327"/>
+              <a:ext cx="1491466" cy="1491570"/>
             </a:xfrm>
             <a:prstGeom prst="rect">
               <a:avLst/>
@@ -3026,6 +3021,11 @@
             <a:ln>
               <a:noFill/>
             </a:ln>
+            <a:effectLst>
+              <a:glow rad="254000">
+                <a:schemeClr val="bg1"/>
+              </a:glow>
+            </a:effectLst>
           </p:spPr>
           <p:style>
             <a:lnRef idx="2">
@@ -3048,170 +3048,239 @@
             <a:lstStyle/>
             <a:p>
               <a:pPr algn="ctr"/>
-              <a:endParaRPr lang="en-AU" sz="100"/>
+              <a:endParaRPr lang="en-AU"/>
             </a:p>
           </p:txBody>
         </p:sp>
-        <p:sp>
-          <p:nvSpPr>
-            <p:cNvPr id="5" name="Isosceles Triangle 4">
+        <p:grpSp>
+          <p:nvGrpSpPr>
+            <p:cNvPr id="39" name="Group 38">
               <a:extLst>
                 <a:ext uri="{FF2B5EF4-FFF2-40B4-BE49-F238E27FC236}">
-                  <a16:creationId xmlns:a16="http://schemas.microsoft.com/office/drawing/2014/main" id="{6DBC495A-5066-41BB-9D6B-19616BA35479}"/>
+                  <a16:creationId xmlns:a16="http://schemas.microsoft.com/office/drawing/2014/main" id="{4F4DD76A-382E-46D9-A840-1AA73730AA44}"/>
                 </a:ext>
               </a:extLst>
             </p:cNvPr>
-            <p:cNvSpPr/>
+            <p:cNvGrpSpPr/>
             <p:nvPr/>
-          </p:nvSpPr>
-          <p:spPr>
-            <a:xfrm rot="5400000">
-              <a:off x="9292166" y="2379134"/>
-              <a:ext cx="2396067" cy="2099733"/>
+          </p:nvGrpSpPr>
+          <p:grpSpPr>
+            <a:xfrm rot="2748745">
+              <a:off x="322834" y="416540"/>
+              <a:ext cx="1395502" cy="1215020"/>
+              <a:chOff x="1863747" y="561351"/>
+              <a:chExt cx="10185405" cy="6595524"/>
             </a:xfrm>
-            <a:prstGeom prst="triangle">
-              <a:avLst/>
-            </a:prstGeom>
             <a:solidFill>
-              <a:schemeClr val="tx1"/>
+              <a:schemeClr val="bg1"/>
             </a:solidFill>
-            <a:ln>
-              <a:noFill/>
-            </a:ln>
-          </p:spPr>
-          <p:style>
-            <a:lnRef idx="2">
-              <a:schemeClr val="accent1">
-                <a:shade val="50000"/>
-              </a:schemeClr>
-            </a:lnRef>
-            <a:fillRef idx="1">
-              <a:schemeClr val="accent1"/>
-            </a:fillRef>
-            <a:effectRef idx="0">
-              <a:schemeClr val="accent1"/>
-            </a:effectRef>
-            <a:fontRef idx="minor">
-              <a:schemeClr val="lt1"/>
-            </a:fontRef>
-          </p:style>
-          <p:txBody>
-            <a:bodyPr rtlCol="0" anchor="ctr"/>
-            <a:lstStyle/>
-            <a:p>
-              <a:pPr algn="ctr"/>
-              <a:endParaRPr lang="en-AU" sz="100"/>
-            </a:p>
-          </p:txBody>
-        </p:sp>
-        <p:sp>
-          <p:nvSpPr>
-            <p:cNvPr id="6" name="Isosceles Triangle 5">
-              <a:extLst>
-                <a:ext uri="{FF2B5EF4-FFF2-40B4-BE49-F238E27FC236}">
-                  <a16:creationId xmlns:a16="http://schemas.microsoft.com/office/drawing/2014/main" id="{50049509-024F-43EA-A614-2C31B6803B8F}"/>
-                </a:ext>
-              </a:extLst>
-            </p:cNvPr>
-            <p:cNvSpPr/>
-            <p:nvPr/>
-          </p:nvSpPr>
-          <p:spPr>
-            <a:xfrm>
-              <a:off x="2616199" y="131232"/>
-              <a:ext cx="2396067" cy="2099733"/>
-            </a:xfrm>
-            <a:prstGeom prst="triangle">
-              <a:avLst>
-                <a:gd name="adj" fmla="val 0"/>
-              </a:avLst>
-            </a:prstGeom>
-            <a:solidFill>
-              <a:schemeClr val="tx1"/>
-            </a:solidFill>
-            <a:ln>
-              <a:noFill/>
-            </a:ln>
-          </p:spPr>
-          <p:style>
-            <a:lnRef idx="2">
-              <a:schemeClr val="accent1">
-                <a:shade val="50000"/>
-              </a:schemeClr>
-            </a:lnRef>
-            <a:fillRef idx="1">
-              <a:schemeClr val="accent1"/>
-            </a:fillRef>
-            <a:effectRef idx="0">
-              <a:schemeClr val="accent1"/>
-            </a:effectRef>
-            <a:fontRef idx="minor">
-              <a:schemeClr val="lt1"/>
-            </a:fontRef>
-          </p:style>
-          <p:txBody>
-            <a:bodyPr rtlCol="0" anchor="ctr"/>
-            <a:lstStyle/>
-            <a:p>
-              <a:pPr algn="ctr"/>
-              <a:endParaRPr lang="en-AU" sz="100"/>
-            </a:p>
-          </p:txBody>
-        </p:sp>
-        <p:sp>
-          <p:nvSpPr>
-            <p:cNvPr id="7" name="Isosceles Triangle 6">
-              <a:extLst>
-                <a:ext uri="{FF2B5EF4-FFF2-40B4-BE49-F238E27FC236}">
-                  <a16:creationId xmlns:a16="http://schemas.microsoft.com/office/drawing/2014/main" id="{09592E3D-F6C0-461B-8709-73F823E65EF4}"/>
-                </a:ext>
-              </a:extLst>
-            </p:cNvPr>
-            <p:cNvSpPr/>
-            <p:nvPr/>
-          </p:nvSpPr>
-          <p:spPr>
-            <a:xfrm rot="10800000">
-              <a:off x="2616200" y="4627034"/>
-              <a:ext cx="2396067" cy="2099733"/>
-            </a:xfrm>
-            <a:prstGeom prst="triangle">
-              <a:avLst>
-                <a:gd name="adj" fmla="val 100000"/>
-              </a:avLst>
-            </a:prstGeom>
-            <a:solidFill>
-              <a:schemeClr val="tx1"/>
-            </a:solidFill>
-            <a:ln>
-              <a:noFill/>
-            </a:ln>
-          </p:spPr>
-          <p:style>
-            <a:lnRef idx="2">
-              <a:schemeClr val="accent1">
-                <a:shade val="50000"/>
-              </a:schemeClr>
-            </a:lnRef>
-            <a:fillRef idx="1">
-              <a:schemeClr val="accent1"/>
-            </a:fillRef>
-            <a:effectRef idx="0">
-              <a:schemeClr val="accent1"/>
-            </a:effectRef>
-            <a:fontRef idx="minor">
-              <a:schemeClr val="lt1"/>
-            </a:fontRef>
-          </p:style>
-          <p:txBody>
-            <a:bodyPr rtlCol="0" anchor="ctr"/>
-            <a:lstStyle/>
-            <a:p>
-              <a:pPr algn="ctr"/>
-              <a:endParaRPr lang="en-AU" sz="100"/>
-            </a:p>
-          </p:txBody>
-        </p:sp>
+            <a:effectLst/>
+          </p:grpSpPr>
+          <p:sp>
+            <p:nvSpPr>
+              <p:cNvPr id="4" name="Rectangle 3">
+                <a:extLst>
+                  <a:ext uri="{FF2B5EF4-FFF2-40B4-BE49-F238E27FC236}">
+                    <a16:creationId xmlns:a16="http://schemas.microsoft.com/office/drawing/2014/main" id="{ED4C6AF5-E0CD-4909-A091-D24C7B5ADFEC}"/>
+                  </a:ext>
+                </a:extLst>
+              </p:cNvPr>
+              <p:cNvSpPr/>
+              <p:nvPr/>
+            </p:nvSpPr>
+            <p:spPr>
+              <a:xfrm>
+                <a:off x="1863747" y="2661075"/>
+                <a:ext cx="7662334" cy="2396068"/>
+              </a:xfrm>
+              <a:prstGeom prst="rect">
+                <a:avLst/>
+              </a:prstGeom>
+              <a:grpFill/>
+              <a:ln>
+                <a:noFill/>
+              </a:ln>
+            </p:spPr>
+            <p:style>
+              <a:lnRef idx="2">
+                <a:schemeClr val="accent1">
+                  <a:shade val="50000"/>
+                </a:schemeClr>
+              </a:lnRef>
+              <a:fillRef idx="1">
+                <a:schemeClr val="accent1"/>
+              </a:fillRef>
+              <a:effectRef idx="0">
+                <a:schemeClr val="accent1"/>
+              </a:effectRef>
+              <a:fontRef idx="minor">
+                <a:schemeClr val="lt1"/>
+              </a:fontRef>
+            </p:style>
+            <p:txBody>
+              <a:bodyPr rtlCol="0" anchor="ctr"/>
+              <a:lstStyle/>
+              <a:p>
+                <a:pPr algn="ctr"/>
+                <a:endParaRPr lang="en-AU" sz="100"/>
+              </a:p>
+            </p:txBody>
+          </p:sp>
+          <p:sp>
+            <p:nvSpPr>
+              <p:cNvPr id="5" name="Isosceles Triangle 4">
+                <a:extLst>
+                  <a:ext uri="{FF2B5EF4-FFF2-40B4-BE49-F238E27FC236}">
+                    <a16:creationId xmlns:a16="http://schemas.microsoft.com/office/drawing/2014/main" id="{6DBC495A-5066-41BB-9D6B-19616BA35479}"/>
+                  </a:ext>
+                </a:extLst>
+              </p:cNvPr>
+              <p:cNvSpPr/>
+              <p:nvPr/>
+            </p:nvSpPr>
+            <p:spPr>
+              <a:xfrm rot="5400000">
+                <a:off x="9801253" y="2809245"/>
+                <a:ext cx="2396068" cy="2099731"/>
+              </a:xfrm>
+              <a:prstGeom prst="triangle">
+                <a:avLst/>
+              </a:prstGeom>
+              <a:grpFill/>
+              <a:ln>
+                <a:noFill/>
+              </a:ln>
+            </p:spPr>
+            <p:style>
+              <a:lnRef idx="2">
+                <a:schemeClr val="accent1">
+                  <a:shade val="50000"/>
+                </a:schemeClr>
+              </a:lnRef>
+              <a:fillRef idx="1">
+                <a:schemeClr val="accent1"/>
+              </a:fillRef>
+              <a:effectRef idx="0">
+                <a:schemeClr val="accent1"/>
+              </a:effectRef>
+              <a:fontRef idx="minor">
+                <a:schemeClr val="lt1"/>
+              </a:fontRef>
+            </p:style>
+            <p:txBody>
+              <a:bodyPr rtlCol="0" anchor="ctr"/>
+              <a:lstStyle/>
+              <a:p>
+                <a:pPr algn="ctr"/>
+                <a:endParaRPr lang="en-AU" sz="100"/>
+              </a:p>
+            </p:txBody>
+          </p:sp>
+          <p:sp>
+            <p:nvSpPr>
+              <p:cNvPr id="6" name="Isosceles Triangle 5">
+                <a:extLst>
+                  <a:ext uri="{FF2B5EF4-FFF2-40B4-BE49-F238E27FC236}">
+                    <a16:creationId xmlns:a16="http://schemas.microsoft.com/office/drawing/2014/main" id="{50049509-024F-43EA-A614-2C31B6803B8F}"/>
+                  </a:ext>
+                </a:extLst>
+              </p:cNvPr>
+              <p:cNvSpPr/>
+              <p:nvPr/>
+            </p:nvSpPr>
+            <p:spPr>
+              <a:xfrm>
+                <a:off x="3125278" y="561351"/>
+                <a:ext cx="2396067" cy="2099731"/>
+              </a:xfrm>
+              <a:prstGeom prst="triangle">
+                <a:avLst>
+                  <a:gd name="adj" fmla="val 5040"/>
+                </a:avLst>
+              </a:prstGeom>
+              <a:grpFill/>
+              <a:ln>
+                <a:noFill/>
+              </a:ln>
+            </p:spPr>
+            <p:style>
+              <a:lnRef idx="2">
+                <a:schemeClr val="accent1">
+                  <a:shade val="50000"/>
+                </a:schemeClr>
+              </a:lnRef>
+              <a:fillRef idx="1">
+                <a:schemeClr val="accent1"/>
+              </a:fillRef>
+              <a:effectRef idx="0">
+                <a:schemeClr val="accent1"/>
+              </a:effectRef>
+              <a:fontRef idx="minor">
+                <a:schemeClr val="lt1"/>
+              </a:fontRef>
+            </p:style>
+            <p:txBody>
+              <a:bodyPr rtlCol="0" anchor="ctr"/>
+              <a:lstStyle/>
+              <a:p>
+                <a:pPr algn="ctr"/>
+                <a:endParaRPr lang="en-AU" sz="100"/>
+              </a:p>
+            </p:txBody>
+          </p:sp>
+          <p:sp>
+            <p:nvSpPr>
+              <p:cNvPr id="7" name="Isosceles Triangle 6">
+                <a:extLst>
+                  <a:ext uri="{FF2B5EF4-FFF2-40B4-BE49-F238E27FC236}">
+                    <a16:creationId xmlns:a16="http://schemas.microsoft.com/office/drawing/2014/main" id="{09592E3D-F6C0-461B-8709-73F823E65EF4}"/>
+                  </a:ext>
+                </a:extLst>
+              </p:cNvPr>
+              <p:cNvSpPr/>
+              <p:nvPr/>
+            </p:nvSpPr>
+            <p:spPr>
+              <a:xfrm rot="10800000">
+                <a:off x="3125283" y="5057144"/>
+                <a:ext cx="2396067" cy="2099731"/>
+              </a:xfrm>
+              <a:prstGeom prst="triangle">
+                <a:avLst>
+                  <a:gd name="adj" fmla="val 100000"/>
+                </a:avLst>
+              </a:prstGeom>
+              <a:grpFill/>
+              <a:ln>
+                <a:noFill/>
+              </a:ln>
+            </p:spPr>
+            <p:style>
+              <a:lnRef idx="2">
+                <a:schemeClr val="accent1">
+                  <a:shade val="50000"/>
+                </a:schemeClr>
+              </a:lnRef>
+              <a:fillRef idx="1">
+                <a:schemeClr val="accent1"/>
+              </a:fillRef>
+              <a:effectRef idx="0">
+                <a:schemeClr val="accent1"/>
+              </a:effectRef>
+              <a:fontRef idx="minor">
+                <a:schemeClr val="lt1"/>
+              </a:fontRef>
+            </p:style>
+            <p:txBody>
+              <a:bodyPr rtlCol="0" anchor="ctr"/>
+              <a:lstStyle/>
+              <a:p>
+                <a:pPr algn="ctr"/>
+                <a:endParaRPr lang="en-AU" sz="100"/>
+              </a:p>
+            </p:txBody>
+          </p:sp>
+        </p:grpSp>
       </p:grpSp>
     </p:spTree>
     <p:extLst>
@@ -3245,10 +3314,10 @@
       </p:grpSpPr>
       <p:grpSp>
         <p:nvGrpSpPr>
-          <p:cNvPr id="28" name="Group 27">
+          <p:cNvPr id="2" name="Group 1">
             <a:extLst>
               <a:ext uri="{FF2B5EF4-FFF2-40B4-BE49-F238E27FC236}">
-                <a16:creationId xmlns:a16="http://schemas.microsoft.com/office/drawing/2014/main" id="{A0E9FC7A-7162-47C7-95B0-765C1D25AC26}"/>
+                <a16:creationId xmlns:a16="http://schemas.microsoft.com/office/drawing/2014/main" id="{A7DA5FC3-CAFD-4B80-868E-51C2AE5A7825}"/>
               </a:ext>
             </a:extLst>
           </p:cNvPr>
@@ -3256,24 +3325,19 @@
           <p:nvPr/>
         </p:nvGrpSpPr>
         <p:grpSpPr>
-          <a:xfrm rot="3281532">
-            <a:off x="-674693" y="62756"/>
-            <a:ext cx="2733752" cy="926344"/>
-            <a:chOff x="397931" y="2230966"/>
-            <a:chExt cx="11319935" cy="2396067"/>
+          <a:xfrm>
+            <a:off x="154379" y="144081"/>
+            <a:ext cx="1491466" cy="1622551"/>
+            <a:chOff x="154379" y="144081"/>
+            <a:chExt cx="1491466" cy="1622551"/>
           </a:xfrm>
-          <a:effectLst>
-            <a:glow rad="635000">
-              <a:schemeClr val="bg1"/>
-            </a:glow>
-          </a:effectLst>
         </p:grpSpPr>
         <p:sp>
           <p:nvSpPr>
-            <p:cNvPr id="4" name="Rectangle 3">
+            <p:cNvPr id="9" name="Rectangle 8">
               <a:extLst>
                 <a:ext uri="{FF2B5EF4-FFF2-40B4-BE49-F238E27FC236}">
-                  <a16:creationId xmlns:a16="http://schemas.microsoft.com/office/drawing/2014/main" id="{ED4C6AF5-E0CD-4909-A091-D24C7B5ADFEC}"/>
+                  <a16:creationId xmlns:a16="http://schemas.microsoft.com/office/drawing/2014/main" id="{A65E572B-418C-4D90-AB2B-F3A316DDA6DB}"/>
                 </a:ext>
               </a:extLst>
             </p:cNvPr>
@@ -3282,8 +3346,8 @@
           </p:nvSpPr>
           <p:spPr>
             <a:xfrm>
-              <a:off x="4292600" y="2230966"/>
-              <a:ext cx="4902199" cy="2396067"/>
+              <a:off x="154379" y="144081"/>
+              <a:ext cx="1491466" cy="1508515"/>
             </a:xfrm>
             <a:prstGeom prst="rect">
               <a:avLst/>
@@ -3294,6 +3358,11 @@
             <a:ln>
               <a:noFill/>
             </a:ln>
+            <a:effectLst>
+              <a:glow rad="254000">
+                <a:schemeClr val="bg1"/>
+              </a:glow>
+            </a:effectLst>
           </p:spPr>
           <p:style>
             <a:lnRef idx="2">
@@ -3316,222 +3385,135 @@
             <a:lstStyle/>
             <a:p>
               <a:pPr algn="ctr"/>
-              <a:endParaRPr lang="en-AU" sz="100"/>
+              <a:endParaRPr lang="en-AU"/>
             </a:p>
           </p:txBody>
         </p:sp>
-        <p:sp>
-          <p:nvSpPr>
-            <p:cNvPr id="5" name="Isosceles Triangle 4">
+        <p:grpSp>
+          <p:nvGrpSpPr>
+            <p:cNvPr id="10" name="Group 9">
               <a:extLst>
                 <a:ext uri="{FF2B5EF4-FFF2-40B4-BE49-F238E27FC236}">
-                  <a16:creationId xmlns:a16="http://schemas.microsoft.com/office/drawing/2014/main" id="{6DBC495A-5066-41BB-9D6B-19616BA35479}"/>
+                  <a16:creationId xmlns:a16="http://schemas.microsoft.com/office/drawing/2014/main" id="{C2B280AE-E010-4A30-AE38-ACD4AD3C4798}"/>
                 </a:ext>
               </a:extLst>
             </p:cNvPr>
-            <p:cNvSpPr/>
+            <p:cNvGrpSpPr/>
             <p:nvPr/>
-          </p:nvSpPr>
-          <p:spPr>
-            <a:xfrm rot="5400000">
-              <a:off x="9469966" y="2379133"/>
-              <a:ext cx="2396067" cy="2099733"/>
+          </p:nvGrpSpPr>
+          <p:grpSpPr>
+            <a:xfrm rot="2748745">
+              <a:off x="153409" y="739013"/>
+              <a:ext cx="1613837" cy="441401"/>
+              <a:chOff x="1354668" y="2230967"/>
+              <a:chExt cx="10185398" cy="2396067"/>
             </a:xfrm>
-            <a:prstGeom prst="triangle">
-              <a:avLst/>
-            </a:prstGeom>
             <a:solidFill>
-              <a:schemeClr val="tx1"/>
+              <a:schemeClr val="bg1"/>
             </a:solidFill>
-            <a:ln>
-              <a:noFill/>
-            </a:ln>
-          </p:spPr>
-          <p:style>
-            <a:lnRef idx="2">
-              <a:schemeClr val="accent1">
-                <a:shade val="50000"/>
-              </a:schemeClr>
-            </a:lnRef>
-            <a:fillRef idx="1">
-              <a:schemeClr val="accent1"/>
-            </a:fillRef>
-            <a:effectRef idx="0">
-              <a:schemeClr val="accent1"/>
-            </a:effectRef>
-            <a:fontRef idx="minor">
-              <a:schemeClr val="lt1"/>
-            </a:fontRef>
-          </p:style>
-          <p:txBody>
-            <a:bodyPr rtlCol="0" anchor="ctr"/>
-            <a:lstStyle/>
-            <a:p>
-              <a:pPr algn="ctr"/>
-              <a:endParaRPr lang="en-AU" sz="100"/>
-            </a:p>
-          </p:txBody>
-        </p:sp>
-        <p:sp>
-          <p:nvSpPr>
-            <p:cNvPr id="6" name="Isosceles Triangle 5">
-              <a:extLst>
-                <a:ext uri="{FF2B5EF4-FFF2-40B4-BE49-F238E27FC236}">
-                  <a16:creationId xmlns:a16="http://schemas.microsoft.com/office/drawing/2014/main" id="{50049509-024F-43EA-A614-2C31B6803B8F}"/>
-                </a:ext>
-              </a:extLst>
-            </p:cNvPr>
-            <p:cNvSpPr/>
-            <p:nvPr/>
-          </p:nvSpPr>
-          <p:spPr>
-            <a:xfrm>
-              <a:off x="397932" y="2230966"/>
-              <a:ext cx="3894668" cy="850900"/>
-            </a:xfrm>
-            <a:prstGeom prst="triangle">
-              <a:avLst>
-                <a:gd name="adj" fmla="val 100000"/>
-              </a:avLst>
-            </a:prstGeom>
-            <a:solidFill>
-              <a:schemeClr val="tx1"/>
-            </a:solidFill>
-            <a:ln>
-              <a:noFill/>
-            </a:ln>
-          </p:spPr>
-          <p:style>
-            <a:lnRef idx="2">
-              <a:schemeClr val="accent1">
-                <a:shade val="50000"/>
-              </a:schemeClr>
-            </a:lnRef>
-            <a:fillRef idx="1">
-              <a:schemeClr val="accent1"/>
-            </a:fillRef>
-            <a:effectRef idx="0">
-              <a:schemeClr val="accent1"/>
-            </a:effectRef>
-            <a:fontRef idx="minor">
-              <a:schemeClr val="lt1"/>
-            </a:fontRef>
-          </p:style>
-          <p:txBody>
-            <a:bodyPr rtlCol="0" anchor="ctr"/>
-            <a:lstStyle/>
-            <a:p>
-              <a:pPr algn="ctr"/>
-              <a:endParaRPr lang="en-AU" sz="100"/>
-            </a:p>
-          </p:txBody>
-        </p:sp>
-        <p:sp>
-          <p:nvSpPr>
-            <p:cNvPr id="7" name="Isosceles Triangle 6">
-              <a:extLst>
-                <a:ext uri="{FF2B5EF4-FFF2-40B4-BE49-F238E27FC236}">
-                  <a16:creationId xmlns:a16="http://schemas.microsoft.com/office/drawing/2014/main" id="{09592E3D-F6C0-461B-8709-73F823E65EF4}"/>
-                </a:ext>
-              </a:extLst>
-            </p:cNvPr>
-            <p:cNvSpPr/>
-            <p:nvPr/>
-          </p:nvSpPr>
-          <p:spPr>
-            <a:xfrm rot="10800000">
-              <a:off x="397931" y="3776133"/>
-              <a:ext cx="3894667" cy="850900"/>
-            </a:xfrm>
-            <a:prstGeom prst="triangle">
-              <a:avLst>
-                <a:gd name="adj" fmla="val 0"/>
-              </a:avLst>
-            </a:prstGeom>
-            <a:solidFill>
-              <a:schemeClr val="tx1"/>
-            </a:solidFill>
-            <a:ln>
-              <a:noFill/>
-            </a:ln>
-          </p:spPr>
-          <p:style>
-            <a:lnRef idx="2">
-              <a:schemeClr val="accent1">
-                <a:shade val="50000"/>
-              </a:schemeClr>
-            </a:lnRef>
-            <a:fillRef idx="1">
-              <a:schemeClr val="accent1"/>
-            </a:fillRef>
-            <a:effectRef idx="0">
-              <a:schemeClr val="accent1"/>
-            </a:effectRef>
-            <a:fontRef idx="minor">
-              <a:schemeClr val="lt1"/>
-            </a:fontRef>
-          </p:style>
-          <p:txBody>
-            <a:bodyPr rtlCol="0" anchor="ctr"/>
-            <a:lstStyle/>
-            <a:p>
-              <a:pPr algn="ctr"/>
-              <a:endParaRPr lang="en-AU" sz="100"/>
-            </a:p>
-          </p:txBody>
-        </p:sp>
-        <p:sp>
-          <p:nvSpPr>
-            <p:cNvPr id="8" name="Rectangle 7">
-              <a:extLst>
-                <a:ext uri="{FF2B5EF4-FFF2-40B4-BE49-F238E27FC236}">
-                  <a16:creationId xmlns:a16="http://schemas.microsoft.com/office/drawing/2014/main" id="{47599C1F-F823-4CBD-AF79-4197526A6003}"/>
-                </a:ext>
-              </a:extLst>
-            </p:cNvPr>
-            <p:cNvSpPr/>
-            <p:nvPr/>
-          </p:nvSpPr>
-          <p:spPr>
-            <a:xfrm>
-              <a:off x="397932" y="3081866"/>
-              <a:ext cx="3894666" cy="694267"/>
-            </a:xfrm>
-            <a:prstGeom prst="rect">
-              <a:avLst/>
-            </a:prstGeom>
-            <a:solidFill>
-              <a:schemeClr val="tx1"/>
-            </a:solidFill>
-            <a:ln>
-              <a:noFill/>
-            </a:ln>
-          </p:spPr>
-          <p:style>
-            <a:lnRef idx="2">
-              <a:schemeClr val="accent1">
-                <a:shade val="50000"/>
-              </a:schemeClr>
-            </a:lnRef>
-            <a:fillRef idx="1">
-              <a:schemeClr val="accent1"/>
-            </a:fillRef>
-            <a:effectRef idx="0">
-              <a:schemeClr val="accent1"/>
-            </a:effectRef>
-            <a:fontRef idx="minor">
-              <a:schemeClr val="lt1"/>
-            </a:fontRef>
-          </p:style>
-          <p:txBody>
-            <a:bodyPr rtlCol="0" anchor="ctr"/>
-            <a:lstStyle/>
-            <a:p>
-              <a:pPr algn="ctr"/>
-              <a:endParaRPr lang="en-AU" sz="100"/>
-            </a:p>
-          </p:txBody>
-        </p:sp>
+            <a:effectLst/>
+          </p:grpSpPr>
+          <p:sp>
+            <p:nvSpPr>
+              <p:cNvPr id="11" name="Rectangle 10">
+                <a:extLst>
+                  <a:ext uri="{FF2B5EF4-FFF2-40B4-BE49-F238E27FC236}">
+                    <a16:creationId xmlns:a16="http://schemas.microsoft.com/office/drawing/2014/main" id="{9DA2F33B-55B9-40F5-AF15-8902F02FAB69}"/>
+                  </a:ext>
+                </a:extLst>
+              </p:cNvPr>
+              <p:cNvSpPr/>
+              <p:nvPr/>
+            </p:nvSpPr>
+            <p:spPr>
+              <a:xfrm>
+                <a:off x="1354668" y="2230967"/>
+                <a:ext cx="7662332" cy="2396067"/>
+              </a:xfrm>
+              <a:prstGeom prst="rect">
+                <a:avLst/>
+              </a:prstGeom>
+              <a:grpFill/>
+              <a:ln>
+                <a:noFill/>
+              </a:ln>
+            </p:spPr>
+            <p:style>
+              <a:lnRef idx="2">
+                <a:schemeClr val="accent1">
+                  <a:shade val="50000"/>
+                </a:schemeClr>
+              </a:lnRef>
+              <a:fillRef idx="1">
+                <a:schemeClr val="accent1"/>
+              </a:fillRef>
+              <a:effectRef idx="0">
+                <a:schemeClr val="accent1"/>
+              </a:effectRef>
+              <a:fontRef idx="minor">
+                <a:schemeClr val="lt1"/>
+              </a:fontRef>
+            </p:style>
+            <p:txBody>
+              <a:bodyPr rtlCol="0" anchor="ctr"/>
+              <a:lstStyle/>
+              <a:p>
+                <a:pPr algn="ctr"/>
+                <a:endParaRPr lang="en-AU" sz="100"/>
+              </a:p>
+            </p:txBody>
+          </p:sp>
+          <p:sp>
+            <p:nvSpPr>
+              <p:cNvPr id="12" name="Isosceles Triangle 11">
+                <a:extLst>
+                  <a:ext uri="{FF2B5EF4-FFF2-40B4-BE49-F238E27FC236}">
+                    <a16:creationId xmlns:a16="http://schemas.microsoft.com/office/drawing/2014/main" id="{C4E4B0DF-6A12-40C2-86B3-3E534A195403}"/>
+                  </a:ext>
+                </a:extLst>
+              </p:cNvPr>
+              <p:cNvSpPr/>
+              <p:nvPr/>
+            </p:nvSpPr>
+            <p:spPr>
+              <a:xfrm rot="5400000">
+                <a:off x="9292166" y="2379134"/>
+                <a:ext cx="2396067" cy="2099733"/>
+              </a:xfrm>
+              <a:prstGeom prst="triangle">
+                <a:avLst/>
+              </a:prstGeom>
+              <a:grpFill/>
+              <a:ln>
+                <a:noFill/>
+              </a:ln>
+            </p:spPr>
+            <p:style>
+              <a:lnRef idx="2">
+                <a:schemeClr val="accent1">
+                  <a:shade val="50000"/>
+                </a:schemeClr>
+              </a:lnRef>
+              <a:fillRef idx="1">
+                <a:schemeClr val="accent1"/>
+              </a:fillRef>
+              <a:effectRef idx="0">
+                <a:schemeClr val="accent1"/>
+              </a:effectRef>
+              <a:fontRef idx="minor">
+                <a:schemeClr val="lt1"/>
+              </a:fontRef>
+            </p:style>
+            <p:txBody>
+              <a:bodyPr rtlCol="0" anchor="ctr"/>
+              <a:lstStyle/>
+              <a:p>
+                <a:pPr algn="ctr"/>
+                <a:endParaRPr lang="en-AU" sz="100"/>
+              </a:p>
+            </p:txBody>
+          </p:sp>
+        </p:grpSp>
       </p:grpSp>
     </p:spTree>
     <p:extLst>
@@ -3565,10 +3547,10 @@
       </p:grpSpPr>
       <p:grpSp>
         <p:nvGrpSpPr>
-          <p:cNvPr id="3" name="Group 2">
+          <p:cNvPr id="2" name="Group 1">
             <a:extLst>
               <a:ext uri="{FF2B5EF4-FFF2-40B4-BE49-F238E27FC236}">
-                <a16:creationId xmlns:a16="http://schemas.microsoft.com/office/drawing/2014/main" id="{6F3E6258-4EA0-4ECA-AC76-1D78BFEEBC7B}"/>
+                <a16:creationId xmlns:a16="http://schemas.microsoft.com/office/drawing/2014/main" id="{2F6AB352-B86C-4F93-8172-0322A0B8493F}"/>
               </a:ext>
             </a:extLst>
           </p:cNvPr>
@@ -3577,23 +3559,18 @@
         </p:nvGrpSpPr>
         <p:grpSpPr>
           <a:xfrm>
-            <a:off x="-183675" y="94594"/>
-            <a:ext cx="2091303" cy="1597572"/>
-            <a:chOff x="2616199" y="1411816"/>
-            <a:chExt cx="6400799" cy="3503085"/>
+            <a:off x="154379" y="144081"/>
+            <a:ext cx="1491466" cy="1508515"/>
+            <a:chOff x="154379" y="144081"/>
+            <a:chExt cx="1491466" cy="1508515"/>
           </a:xfrm>
-          <a:effectLst>
-            <a:glow rad="635000">
-              <a:schemeClr val="bg1"/>
-            </a:glow>
-          </a:effectLst>
         </p:grpSpPr>
         <p:sp>
           <p:nvSpPr>
-            <p:cNvPr id="4" name="Rectangle 3">
+            <p:cNvPr id="9" name="Rectangle 8">
               <a:extLst>
                 <a:ext uri="{FF2B5EF4-FFF2-40B4-BE49-F238E27FC236}">
-                  <a16:creationId xmlns:a16="http://schemas.microsoft.com/office/drawing/2014/main" id="{ED4C6AF5-E0CD-4909-A091-D24C7B5ADFEC}"/>
+                  <a16:creationId xmlns:a16="http://schemas.microsoft.com/office/drawing/2014/main" id="{9B6F0D5E-492E-440A-953C-42F1EAC21A39}"/>
                 </a:ext>
               </a:extLst>
             </p:cNvPr>
@@ -3602,8 +3579,8 @@
           </p:nvSpPr>
           <p:spPr>
             <a:xfrm>
-              <a:off x="2616199" y="2540000"/>
-              <a:ext cx="6400799" cy="2374901"/>
+              <a:off x="154379" y="144081"/>
+              <a:ext cx="1491466" cy="1508515"/>
             </a:xfrm>
             <a:prstGeom prst="rect">
               <a:avLst/>
@@ -3614,6 +3591,11 @@
             <a:ln>
               <a:noFill/>
             </a:ln>
+            <a:effectLst>
+              <a:glow rad="254000">
+                <a:schemeClr val="bg1"/>
+              </a:glow>
+            </a:effectLst>
           </p:spPr>
           <p:style>
             <a:lnRef idx="2">
@@ -3636,170 +3618,239 @@
             <a:lstStyle/>
             <a:p>
               <a:pPr algn="ctr"/>
-              <a:endParaRPr lang="en-AU" sz="100"/>
+              <a:endParaRPr lang="en-AU"/>
             </a:p>
           </p:txBody>
         </p:sp>
-        <p:sp>
-          <p:nvSpPr>
-            <p:cNvPr id="6" name="Isosceles Triangle 5">
+        <p:grpSp>
+          <p:nvGrpSpPr>
+            <p:cNvPr id="3" name="Group 2">
               <a:extLst>
                 <a:ext uri="{FF2B5EF4-FFF2-40B4-BE49-F238E27FC236}">
-                  <a16:creationId xmlns:a16="http://schemas.microsoft.com/office/drawing/2014/main" id="{50049509-024F-43EA-A614-2C31B6803B8F}"/>
+                  <a16:creationId xmlns:a16="http://schemas.microsoft.com/office/drawing/2014/main" id="{6F3E6258-4EA0-4ECA-AC76-1D78BFEEBC7B}"/>
                 </a:ext>
               </a:extLst>
             </p:cNvPr>
-            <p:cNvSpPr/>
+            <p:cNvGrpSpPr/>
             <p:nvPr/>
-          </p:nvSpPr>
-          <p:spPr>
+          </p:nvGrpSpPr>
+          <p:grpSpPr>
             <a:xfrm>
-              <a:off x="2616199" y="1411816"/>
-              <a:ext cx="2396067" cy="804911"/>
+              <a:off x="345840" y="395310"/>
+              <a:ext cx="1108543" cy="1006055"/>
+              <a:chOff x="2616199" y="1411816"/>
+              <a:chExt cx="6400799" cy="3503085"/>
             </a:xfrm>
-            <a:prstGeom prst="triangle">
-              <a:avLst>
-                <a:gd name="adj" fmla="val 100000"/>
-              </a:avLst>
-            </a:prstGeom>
             <a:solidFill>
-              <a:schemeClr val="tx1"/>
+              <a:schemeClr val="bg1"/>
             </a:solidFill>
-            <a:ln>
-              <a:noFill/>
-            </a:ln>
-          </p:spPr>
-          <p:style>
-            <a:lnRef idx="2">
-              <a:schemeClr val="accent1">
-                <a:shade val="50000"/>
-              </a:schemeClr>
-            </a:lnRef>
-            <a:fillRef idx="1">
-              <a:schemeClr val="accent1"/>
-            </a:fillRef>
-            <a:effectRef idx="0">
-              <a:schemeClr val="accent1"/>
-            </a:effectRef>
-            <a:fontRef idx="minor">
-              <a:schemeClr val="lt1"/>
-            </a:fontRef>
-          </p:style>
-          <p:txBody>
-            <a:bodyPr rtlCol="0" anchor="ctr"/>
-            <a:lstStyle/>
-            <a:p>
-              <a:pPr algn="ctr"/>
-              <a:endParaRPr lang="en-AU" sz="100"/>
-            </a:p>
-          </p:txBody>
-        </p:sp>
-        <p:sp>
-          <p:nvSpPr>
-            <p:cNvPr id="7" name="Isosceles Triangle 6">
-              <a:extLst>
-                <a:ext uri="{FF2B5EF4-FFF2-40B4-BE49-F238E27FC236}">
-                  <a16:creationId xmlns:a16="http://schemas.microsoft.com/office/drawing/2014/main" id="{09592E3D-F6C0-461B-8709-73F823E65EF4}"/>
-                </a:ext>
-              </a:extLst>
-            </p:cNvPr>
-            <p:cNvSpPr/>
-            <p:nvPr/>
-          </p:nvSpPr>
-          <p:spPr>
-            <a:xfrm rot="10800000" flipH="1" flipV="1">
-              <a:off x="6620932" y="1411816"/>
-              <a:ext cx="2396066" cy="804911"/>
-            </a:xfrm>
-            <a:prstGeom prst="triangle">
-              <a:avLst>
-                <a:gd name="adj" fmla="val 0"/>
-              </a:avLst>
-            </a:prstGeom>
-            <a:solidFill>
-              <a:schemeClr val="tx1"/>
-            </a:solidFill>
-            <a:ln>
-              <a:noFill/>
-            </a:ln>
-          </p:spPr>
-          <p:style>
-            <a:lnRef idx="2">
-              <a:schemeClr val="accent1">
-                <a:shade val="50000"/>
-              </a:schemeClr>
-            </a:lnRef>
-            <a:fillRef idx="1">
-              <a:schemeClr val="accent1"/>
-            </a:fillRef>
-            <a:effectRef idx="0">
-              <a:schemeClr val="accent1"/>
-            </a:effectRef>
-            <a:fontRef idx="minor">
-              <a:schemeClr val="lt1"/>
-            </a:fontRef>
-          </p:style>
-          <p:txBody>
-            <a:bodyPr rtlCol="0" anchor="ctr"/>
-            <a:lstStyle/>
-            <a:p>
-              <a:pPr algn="ctr"/>
-              <a:endParaRPr lang="en-AU" sz="100"/>
-            </a:p>
-          </p:txBody>
-        </p:sp>
-        <p:sp>
-          <p:nvSpPr>
-            <p:cNvPr id="8" name="Rectangle 7">
-              <a:extLst>
-                <a:ext uri="{FF2B5EF4-FFF2-40B4-BE49-F238E27FC236}">
-                  <a16:creationId xmlns:a16="http://schemas.microsoft.com/office/drawing/2014/main" id="{47599C1F-F823-4CBD-AF79-4197526A6003}"/>
-                </a:ext>
-              </a:extLst>
-            </p:cNvPr>
-            <p:cNvSpPr/>
-            <p:nvPr/>
-          </p:nvSpPr>
-          <p:spPr>
-            <a:xfrm>
-              <a:off x="5012267" y="1411816"/>
-              <a:ext cx="1608666" cy="804911"/>
-            </a:xfrm>
-            <a:prstGeom prst="rect">
-              <a:avLst/>
-            </a:prstGeom>
-            <a:solidFill>
-              <a:schemeClr val="tx1"/>
-            </a:solidFill>
-            <a:ln>
-              <a:noFill/>
-            </a:ln>
-          </p:spPr>
-          <p:style>
-            <a:lnRef idx="2">
-              <a:schemeClr val="accent1">
-                <a:shade val="50000"/>
-              </a:schemeClr>
-            </a:lnRef>
-            <a:fillRef idx="1">
-              <a:schemeClr val="accent1"/>
-            </a:fillRef>
-            <a:effectRef idx="0">
-              <a:schemeClr val="accent1"/>
-            </a:effectRef>
-            <a:fontRef idx="minor">
-              <a:schemeClr val="lt1"/>
-            </a:fontRef>
-          </p:style>
-          <p:txBody>
-            <a:bodyPr rtlCol="0" anchor="ctr"/>
-            <a:lstStyle/>
-            <a:p>
-              <a:pPr algn="ctr"/>
-              <a:endParaRPr lang="en-AU" sz="100"/>
-            </a:p>
-          </p:txBody>
-        </p:sp>
+            <a:effectLst/>
+          </p:grpSpPr>
+          <p:sp>
+            <p:nvSpPr>
+              <p:cNvPr id="4" name="Rectangle 3">
+                <a:extLst>
+                  <a:ext uri="{FF2B5EF4-FFF2-40B4-BE49-F238E27FC236}">
+                    <a16:creationId xmlns:a16="http://schemas.microsoft.com/office/drawing/2014/main" id="{ED4C6AF5-E0CD-4909-A091-D24C7B5ADFEC}"/>
+                  </a:ext>
+                </a:extLst>
+              </p:cNvPr>
+              <p:cNvSpPr/>
+              <p:nvPr/>
+            </p:nvSpPr>
+            <p:spPr>
+              <a:xfrm>
+                <a:off x="2616199" y="2540000"/>
+                <a:ext cx="6400799" cy="2374901"/>
+              </a:xfrm>
+              <a:prstGeom prst="rect">
+                <a:avLst/>
+              </a:prstGeom>
+              <a:grpFill/>
+              <a:ln>
+                <a:noFill/>
+              </a:ln>
+            </p:spPr>
+            <p:style>
+              <a:lnRef idx="2">
+                <a:schemeClr val="accent1">
+                  <a:shade val="50000"/>
+                </a:schemeClr>
+              </a:lnRef>
+              <a:fillRef idx="1">
+                <a:schemeClr val="accent1"/>
+              </a:fillRef>
+              <a:effectRef idx="0">
+                <a:schemeClr val="accent1"/>
+              </a:effectRef>
+              <a:fontRef idx="minor">
+                <a:schemeClr val="lt1"/>
+              </a:fontRef>
+            </p:style>
+            <p:txBody>
+              <a:bodyPr rtlCol="0" anchor="ctr"/>
+              <a:lstStyle/>
+              <a:p>
+                <a:pPr algn="ctr"/>
+                <a:endParaRPr lang="en-AU" sz="100"/>
+              </a:p>
+            </p:txBody>
+          </p:sp>
+          <p:sp>
+            <p:nvSpPr>
+              <p:cNvPr id="6" name="Isosceles Triangle 5">
+                <a:extLst>
+                  <a:ext uri="{FF2B5EF4-FFF2-40B4-BE49-F238E27FC236}">
+                    <a16:creationId xmlns:a16="http://schemas.microsoft.com/office/drawing/2014/main" id="{50049509-024F-43EA-A614-2C31B6803B8F}"/>
+                  </a:ext>
+                </a:extLst>
+              </p:cNvPr>
+              <p:cNvSpPr/>
+              <p:nvPr/>
+            </p:nvSpPr>
+            <p:spPr>
+              <a:xfrm>
+                <a:off x="2616199" y="1411816"/>
+                <a:ext cx="2396067" cy="804911"/>
+              </a:xfrm>
+              <a:prstGeom prst="triangle">
+                <a:avLst>
+                  <a:gd name="adj" fmla="val 100000"/>
+                </a:avLst>
+              </a:prstGeom>
+              <a:grpFill/>
+              <a:ln>
+                <a:noFill/>
+              </a:ln>
+            </p:spPr>
+            <p:style>
+              <a:lnRef idx="2">
+                <a:schemeClr val="accent1">
+                  <a:shade val="50000"/>
+                </a:schemeClr>
+              </a:lnRef>
+              <a:fillRef idx="1">
+                <a:schemeClr val="accent1"/>
+              </a:fillRef>
+              <a:effectRef idx="0">
+                <a:schemeClr val="accent1"/>
+              </a:effectRef>
+              <a:fontRef idx="minor">
+                <a:schemeClr val="lt1"/>
+              </a:fontRef>
+            </p:style>
+            <p:txBody>
+              <a:bodyPr rtlCol="0" anchor="ctr"/>
+              <a:lstStyle/>
+              <a:p>
+                <a:pPr algn="ctr"/>
+                <a:endParaRPr lang="en-AU" sz="100"/>
+              </a:p>
+            </p:txBody>
+          </p:sp>
+          <p:sp>
+            <p:nvSpPr>
+              <p:cNvPr id="7" name="Isosceles Triangle 6">
+                <a:extLst>
+                  <a:ext uri="{FF2B5EF4-FFF2-40B4-BE49-F238E27FC236}">
+                    <a16:creationId xmlns:a16="http://schemas.microsoft.com/office/drawing/2014/main" id="{09592E3D-F6C0-461B-8709-73F823E65EF4}"/>
+                  </a:ext>
+                </a:extLst>
+              </p:cNvPr>
+              <p:cNvSpPr/>
+              <p:nvPr/>
+            </p:nvSpPr>
+            <p:spPr>
+              <a:xfrm rot="10800000" flipH="1" flipV="1">
+                <a:off x="6620932" y="1411816"/>
+                <a:ext cx="2396066" cy="804911"/>
+              </a:xfrm>
+              <a:prstGeom prst="triangle">
+                <a:avLst>
+                  <a:gd name="adj" fmla="val 0"/>
+                </a:avLst>
+              </a:prstGeom>
+              <a:grpFill/>
+              <a:ln>
+                <a:noFill/>
+              </a:ln>
+            </p:spPr>
+            <p:style>
+              <a:lnRef idx="2">
+                <a:schemeClr val="accent1">
+                  <a:shade val="50000"/>
+                </a:schemeClr>
+              </a:lnRef>
+              <a:fillRef idx="1">
+                <a:schemeClr val="accent1"/>
+              </a:fillRef>
+              <a:effectRef idx="0">
+                <a:schemeClr val="accent1"/>
+              </a:effectRef>
+              <a:fontRef idx="minor">
+                <a:schemeClr val="lt1"/>
+              </a:fontRef>
+            </p:style>
+            <p:txBody>
+              <a:bodyPr rtlCol="0" anchor="ctr"/>
+              <a:lstStyle/>
+              <a:p>
+                <a:pPr algn="ctr"/>
+                <a:endParaRPr lang="en-AU" sz="100"/>
+              </a:p>
+            </p:txBody>
+          </p:sp>
+          <p:sp>
+            <p:nvSpPr>
+              <p:cNvPr id="8" name="Rectangle 7">
+                <a:extLst>
+                  <a:ext uri="{FF2B5EF4-FFF2-40B4-BE49-F238E27FC236}">
+                    <a16:creationId xmlns:a16="http://schemas.microsoft.com/office/drawing/2014/main" id="{47599C1F-F823-4CBD-AF79-4197526A6003}"/>
+                  </a:ext>
+                </a:extLst>
+              </p:cNvPr>
+              <p:cNvSpPr/>
+              <p:nvPr/>
+            </p:nvSpPr>
+            <p:spPr>
+              <a:xfrm>
+                <a:off x="5012267" y="1411816"/>
+                <a:ext cx="1608666" cy="804911"/>
+              </a:xfrm>
+              <a:prstGeom prst="rect">
+                <a:avLst/>
+              </a:prstGeom>
+              <a:grpFill/>
+              <a:ln>
+                <a:noFill/>
+              </a:ln>
+            </p:spPr>
+            <p:style>
+              <a:lnRef idx="2">
+                <a:schemeClr val="accent1">
+                  <a:shade val="50000"/>
+                </a:schemeClr>
+              </a:lnRef>
+              <a:fillRef idx="1">
+                <a:schemeClr val="accent1"/>
+              </a:fillRef>
+              <a:effectRef idx="0">
+                <a:schemeClr val="accent1"/>
+              </a:effectRef>
+              <a:fontRef idx="minor">
+                <a:schemeClr val="lt1"/>
+              </a:fontRef>
+            </p:style>
+            <p:txBody>
+              <a:bodyPr rtlCol="0" anchor="ctr"/>
+              <a:lstStyle/>
+              <a:p>
+                <a:pPr algn="ctr"/>
+                <a:endParaRPr lang="en-AU" sz="100"/>
+              </a:p>
+            </p:txBody>
+          </p:sp>
+        </p:grpSp>
       </p:grpSp>
     </p:spTree>
     <p:extLst>
@@ -3833,10 +3884,10 @@
       </p:grpSpPr>
       <p:grpSp>
         <p:nvGrpSpPr>
-          <p:cNvPr id="2" name="Group 1">
+          <p:cNvPr id="25" name="Group 24">
             <a:extLst>
               <a:ext uri="{FF2B5EF4-FFF2-40B4-BE49-F238E27FC236}">
-                <a16:creationId xmlns:a16="http://schemas.microsoft.com/office/drawing/2014/main" id="{783DE72E-87FD-4D11-9109-A1401849E685}"/>
+                <a16:creationId xmlns:a16="http://schemas.microsoft.com/office/drawing/2014/main" id="{653FE928-B41D-4CD2-A071-9E4967A76C6F}"/>
               </a:ext>
             </a:extLst>
           </p:cNvPr>
@@ -3844,24 +3895,19 @@
           <p:nvPr/>
         </p:nvGrpSpPr>
         <p:grpSpPr>
-          <a:xfrm rot="3165644">
-            <a:off x="-1005353" y="-1380024"/>
-            <a:ext cx="3045054" cy="3687902"/>
-            <a:chOff x="1354668" y="131232"/>
-            <a:chExt cx="10185400" cy="6595535"/>
+          <a:xfrm>
+            <a:off x="154379" y="144081"/>
+            <a:ext cx="1491466" cy="1508515"/>
+            <a:chOff x="154379" y="144081"/>
+            <a:chExt cx="1491466" cy="1508515"/>
           </a:xfrm>
-          <a:effectLst>
-            <a:glow rad="635000">
-              <a:schemeClr val="bg1"/>
-            </a:glow>
-          </a:effectLst>
         </p:grpSpPr>
         <p:sp>
           <p:nvSpPr>
-            <p:cNvPr id="4" name="Rectangle 3">
+            <p:cNvPr id="8" name="Rectangle 7">
               <a:extLst>
                 <a:ext uri="{FF2B5EF4-FFF2-40B4-BE49-F238E27FC236}">
-                  <a16:creationId xmlns:a16="http://schemas.microsoft.com/office/drawing/2014/main" id="{ED4C6AF5-E0CD-4909-A091-D24C7B5ADFEC}"/>
+                  <a16:creationId xmlns:a16="http://schemas.microsoft.com/office/drawing/2014/main" id="{10EE5423-1918-4BC9-B52B-7F8022EB9A3E}"/>
                 </a:ext>
               </a:extLst>
             </p:cNvPr>
@@ -3870,14 +3916,304 @@
           </p:nvSpPr>
           <p:spPr>
             <a:xfrm>
-              <a:off x="1354668" y="2230967"/>
-              <a:ext cx="7662332" cy="2396067"/>
+              <a:off x="154379" y="144081"/>
+              <a:ext cx="1491466" cy="1508515"/>
             </a:xfrm>
             <a:prstGeom prst="rect">
               <a:avLst/>
             </a:prstGeom>
             <a:solidFill>
               <a:schemeClr val="tx1"/>
+            </a:solidFill>
+            <a:ln>
+              <a:noFill/>
+            </a:ln>
+            <a:effectLst>
+              <a:glow rad="254000">
+                <a:schemeClr val="bg1"/>
+              </a:glow>
+            </a:effectLst>
+          </p:spPr>
+          <p:style>
+            <a:lnRef idx="2">
+              <a:schemeClr val="accent1">
+                <a:shade val="50000"/>
+              </a:schemeClr>
+            </a:lnRef>
+            <a:fillRef idx="1">
+              <a:schemeClr val="accent1"/>
+            </a:fillRef>
+            <a:effectRef idx="0">
+              <a:schemeClr val="accent1"/>
+            </a:effectRef>
+            <a:fontRef idx="minor">
+              <a:schemeClr val="lt1"/>
+            </a:fontRef>
+          </p:style>
+          <p:txBody>
+            <a:bodyPr rtlCol="0" anchor="ctr"/>
+            <a:lstStyle/>
+            <a:p>
+              <a:pPr algn="ctr"/>
+              <a:endParaRPr lang="en-AU"/>
+            </a:p>
+          </p:txBody>
+        </p:sp>
+        <p:grpSp>
+          <p:nvGrpSpPr>
+            <p:cNvPr id="9" name="Group 8">
+              <a:extLst>
+                <a:ext uri="{FF2B5EF4-FFF2-40B4-BE49-F238E27FC236}">
+                  <a16:creationId xmlns:a16="http://schemas.microsoft.com/office/drawing/2014/main" id="{ECF93AC3-E31E-4C73-A5C1-5166657237C5}"/>
+                </a:ext>
+              </a:extLst>
+            </p:cNvPr>
+            <p:cNvGrpSpPr/>
+            <p:nvPr/>
+          </p:nvGrpSpPr>
+          <p:grpSpPr>
+            <a:xfrm rot="5400000">
+              <a:off x="182979" y="233174"/>
+              <a:ext cx="1414269" cy="1333880"/>
+              <a:chOff x="1354668" y="1333299"/>
+              <a:chExt cx="10211018" cy="4207099"/>
+            </a:xfrm>
+            <a:solidFill>
+              <a:schemeClr val="bg1"/>
+            </a:solidFill>
+            <a:effectLst/>
+          </p:grpSpPr>
+          <p:sp>
+            <p:nvSpPr>
+              <p:cNvPr id="10" name="Rectangle 9">
+                <a:extLst>
+                  <a:ext uri="{FF2B5EF4-FFF2-40B4-BE49-F238E27FC236}">
+                    <a16:creationId xmlns:a16="http://schemas.microsoft.com/office/drawing/2014/main" id="{EE31800D-061B-408D-8C46-84A577D9155B}"/>
+                  </a:ext>
+                </a:extLst>
+              </p:cNvPr>
+              <p:cNvSpPr/>
+              <p:nvPr/>
+            </p:nvSpPr>
+            <p:spPr>
+              <a:xfrm>
+                <a:off x="1354668" y="2230967"/>
+                <a:ext cx="7662332" cy="2396067"/>
+              </a:xfrm>
+              <a:prstGeom prst="rect">
+                <a:avLst/>
+              </a:prstGeom>
+              <a:grpFill/>
+              <a:ln>
+                <a:noFill/>
+              </a:ln>
+            </p:spPr>
+            <p:style>
+              <a:lnRef idx="2">
+                <a:schemeClr val="accent1">
+                  <a:shade val="50000"/>
+                </a:schemeClr>
+              </a:lnRef>
+              <a:fillRef idx="1">
+                <a:schemeClr val="accent1"/>
+              </a:fillRef>
+              <a:effectRef idx="0">
+                <a:schemeClr val="accent1"/>
+              </a:effectRef>
+              <a:fontRef idx="minor">
+                <a:schemeClr val="lt1"/>
+              </a:fontRef>
+            </p:style>
+            <p:txBody>
+              <a:bodyPr rtlCol="0" anchor="ctr"/>
+              <a:lstStyle/>
+              <a:p>
+                <a:pPr algn="ctr"/>
+                <a:endParaRPr lang="en-AU" sz="100"/>
+              </a:p>
+            </p:txBody>
+          </p:sp>
+          <p:sp>
+            <p:nvSpPr>
+              <p:cNvPr id="11" name="Isosceles Triangle 10">
+                <a:extLst>
+                  <a:ext uri="{FF2B5EF4-FFF2-40B4-BE49-F238E27FC236}">
+                    <a16:creationId xmlns:a16="http://schemas.microsoft.com/office/drawing/2014/main" id="{60C5C251-E9E5-4BC5-BCD8-BBD415D55942}"/>
+                  </a:ext>
+                </a:extLst>
+              </p:cNvPr>
+              <p:cNvSpPr/>
+              <p:nvPr/>
+            </p:nvSpPr>
+            <p:spPr>
+              <a:xfrm rot="5400000">
+                <a:off x="10059139" y="1637784"/>
+                <a:ext cx="913360" cy="2099734"/>
+              </a:xfrm>
+              <a:prstGeom prst="triangle">
+                <a:avLst>
+                  <a:gd name="adj" fmla="val 100000"/>
+                </a:avLst>
+              </a:prstGeom>
+              <a:grpFill/>
+              <a:ln>
+                <a:noFill/>
+              </a:ln>
+            </p:spPr>
+            <p:style>
+              <a:lnRef idx="2">
+                <a:schemeClr val="accent1">
+                  <a:shade val="50000"/>
+                </a:schemeClr>
+              </a:lnRef>
+              <a:fillRef idx="1">
+                <a:schemeClr val="accent1"/>
+              </a:fillRef>
+              <a:effectRef idx="0">
+                <a:schemeClr val="accent1"/>
+              </a:effectRef>
+              <a:fontRef idx="minor">
+                <a:schemeClr val="lt1"/>
+              </a:fontRef>
+            </p:style>
+            <p:txBody>
+              <a:bodyPr rtlCol="0" anchor="ctr"/>
+              <a:lstStyle/>
+              <a:p>
+                <a:pPr algn="ctr"/>
+                <a:endParaRPr lang="en-AU" sz="100"/>
+              </a:p>
+            </p:txBody>
+          </p:sp>
+          <p:sp>
+            <p:nvSpPr>
+              <p:cNvPr id="12" name="Isosceles Triangle 11">
+                <a:extLst>
+                  <a:ext uri="{FF2B5EF4-FFF2-40B4-BE49-F238E27FC236}">
+                    <a16:creationId xmlns:a16="http://schemas.microsoft.com/office/drawing/2014/main" id="{5CE6C8B4-A90A-4D0A-9391-94FEC0AD9AB4}"/>
+                  </a:ext>
+                </a:extLst>
+              </p:cNvPr>
+              <p:cNvSpPr/>
+              <p:nvPr/>
+            </p:nvSpPr>
+            <p:spPr>
+              <a:xfrm>
+                <a:off x="2616211" y="1333299"/>
+                <a:ext cx="2396064" cy="897672"/>
+              </a:xfrm>
+              <a:prstGeom prst="triangle">
+                <a:avLst>
+                  <a:gd name="adj" fmla="val 0"/>
+                </a:avLst>
+              </a:prstGeom>
+              <a:grpFill/>
+              <a:ln>
+                <a:noFill/>
+              </a:ln>
+            </p:spPr>
+            <p:style>
+              <a:lnRef idx="2">
+                <a:schemeClr val="accent1">
+                  <a:shade val="50000"/>
+                </a:schemeClr>
+              </a:lnRef>
+              <a:fillRef idx="1">
+                <a:schemeClr val="accent1"/>
+              </a:fillRef>
+              <a:effectRef idx="0">
+                <a:schemeClr val="accent1"/>
+              </a:effectRef>
+              <a:fontRef idx="minor">
+                <a:schemeClr val="lt1"/>
+              </a:fontRef>
+            </p:style>
+            <p:txBody>
+              <a:bodyPr rtlCol="0" anchor="ctr"/>
+              <a:lstStyle/>
+              <a:p>
+                <a:pPr algn="ctr"/>
+                <a:endParaRPr lang="en-AU" sz="100"/>
+              </a:p>
+            </p:txBody>
+          </p:sp>
+          <p:sp>
+            <p:nvSpPr>
+              <p:cNvPr id="13" name="Isosceles Triangle 12">
+                <a:extLst>
+                  <a:ext uri="{FF2B5EF4-FFF2-40B4-BE49-F238E27FC236}">
+                    <a16:creationId xmlns:a16="http://schemas.microsoft.com/office/drawing/2014/main" id="{C673B573-5ADF-434F-9C8E-EA926811FC0B}"/>
+                  </a:ext>
+                </a:extLst>
+              </p:cNvPr>
+              <p:cNvSpPr/>
+              <p:nvPr/>
+            </p:nvSpPr>
+            <p:spPr>
+              <a:xfrm rot="10800000">
+                <a:off x="2616193" y="4627031"/>
+                <a:ext cx="2396064" cy="913367"/>
+              </a:xfrm>
+              <a:prstGeom prst="triangle">
+                <a:avLst>
+                  <a:gd name="adj" fmla="val 100000"/>
+                </a:avLst>
+              </a:prstGeom>
+              <a:grpFill/>
+              <a:ln>
+                <a:noFill/>
+              </a:ln>
+            </p:spPr>
+            <p:style>
+              <a:lnRef idx="2">
+                <a:schemeClr val="accent1">
+                  <a:shade val="50000"/>
+                </a:schemeClr>
+              </a:lnRef>
+              <a:fillRef idx="1">
+                <a:schemeClr val="accent1"/>
+              </a:fillRef>
+              <a:effectRef idx="0">
+                <a:schemeClr val="accent1"/>
+              </a:effectRef>
+              <a:fontRef idx="minor">
+                <a:schemeClr val="lt1"/>
+              </a:fontRef>
+            </p:style>
+            <p:txBody>
+              <a:bodyPr rtlCol="0" anchor="ctr"/>
+              <a:lstStyle/>
+              <a:p>
+                <a:pPr algn="ctr"/>
+                <a:endParaRPr lang="en-AU" sz="100"/>
+              </a:p>
+            </p:txBody>
+          </p:sp>
+        </p:grpSp>
+        <p:sp>
+          <p:nvSpPr>
+            <p:cNvPr id="14" name="Isosceles Triangle 13">
+              <a:extLst>
+                <a:ext uri="{FF2B5EF4-FFF2-40B4-BE49-F238E27FC236}">
+                  <a16:creationId xmlns:a16="http://schemas.microsoft.com/office/drawing/2014/main" id="{089822F4-4296-45D9-9487-FBA5744271C7}"/>
+                </a:ext>
+              </a:extLst>
+            </p:cNvPr>
+            <p:cNvSpPr/>
+            <p:nvPr/>
+          </p:nvSpPr>
+          <p:spPr>
+            <a:xfrm rot="10800000" flipH="1">
+              <a:off x="512756" y="1316423"/>
+              <a:ext cx="289586" cy="290822"/>
+            </a:xfrm>
+            <a:prstGeom prst="triangle">
+              <a:avLst>
+                <a:gd name="adj" fmla="val 100000"/>
+              </a:avLst>
+            </a:prstGeom>
+            <a:solidFill>
+              <a:schemeClr val="bg1"/>
             </a:solidFill>
             <a:ln>
               <a:noFill/>
@@ -3910,10 +4246,10 @@
         </p:sp>
         <p:sp>
           <p:nvSpPr>
-            <p:cNvPr id="5" name="Isosceles Triangle 4">
+            <p:cNvPr id="15" name="Rectangle 14">
               <a:extLst>
                 <a:ext uri="{FF2B5EF4-FFF2-40B4-BE49-F238E27FC236}">
-                  <a16:creationId xmlns:a16="http://schemas.microsoft.com/office/drawing/2014/main" id="{6DBC495A-5066-41BB-9D6B-19616BA35479}"/>
+                  <a16:creationId xmlns:a16="http://schemas.microsoft.com/office/drawing/2014/main" id="{DB17F960-A69D-4DC2-A47F-60657E9017FE}"/>
                 </a:ext>
               </a:extLst>
             </p:cNvPr>
@@ -3921,17 +4257,15 @@
             <p:nvPr/>
           </p:nvSpPr>
           <p:spPr>
-            <a:xfrm rot="5400000">
-              <a:off x="9292166" y="2379134"/>
-              <a:ext cx="2396067" cy="2099733"/>
+            <a:xfrm>
+              <a:off x="802343" y="1316422"/>
+              <a:ext cx="180513" cy="290823"/>
             </a:xfrm>
-            <a:prstGeom prst="triangle">
-              <a:avLst>
-                <a:gd name="adj" fmla="val 48211"/>
-              </a:avLst>
+            <a:prstGeom prst="rect">
+              <a:avLst/>
             </a:prstGeom>
             <a:solidFill>
-              <a:schemeClr val="tx1"/>
+              <a:schemeClr val="bg1"/>
             </a:solidFill>
             <a:ln>
               <a:noFill/>
@@ -3964,10 +4298,10 @@
         </p:sp>
         <p:sp>
           <p:nvSpPr>
-            <p:cNvPr id="6" name="Isosceles Triangle 5">
+            <p:cNvPr id="20" name="Oval 19">
               <a:extLst>
                 <a:ext uri="{FF2B5EF4-FFF2-40B4-BE49-F238E27FC236}">
-                  <a16:creationId xmlns:a16="http://schemas.microsoft.com/office/drawing/2014/main" id="{50049509-024F-43EA-A614-2C31B6803B8F}"/>
+                  <a16:creationId xmlns:a16="http://schemas.microsoft.com/office/drawing/2014/main" id="{B5FBD049-D49F-484D-9F07-0CCEDE58E546}"/>
                 </a:ext>
               </a:extLst>
             </p:cNvPr>
@@ -3976,13 +4310,11 @@
           </p:nvSpPr>
           <p:spPr>
             <a:xfrm>
-              <a:off x="2616199" y="131232"/>
-              <a:ext cx="2396067" cy="2099733"/>
+              <a:off x="628481" y="640721"/>
+              <a:ext cx="528235" cy="515233"/>
             </a:xfrm>
-            <a:prstGeom prst="triangle">
-              <a:avLst>
-                <a:gd name="adj" fmla="val 0"/>
-              </a:avLst>
+            <a:prstGeom prst="ellipse">
+              <a:avLst/>
             </a:prstGeom>
             <a:solidFill>
               <a:schemeClr val="tx1"/>
@@ -4012,16 +4344,174 @@
             <a:lstStyle/>
             <a:p>
               <a:pPr algn="ctr"/>
-              <a:endParaRPr lang="en-AU" sz="100"/>
+              <a:endParaRPr lang="en-AU"/>
             </a:p>
           </p:txBody>
         </p:sp>
         <p:sp>
           <p:nvSpPr>
-            <p:cNvPr id="7" name="Isosceles Triangle 6">
+            <p:cNvPr id="16" name="Oval 15">
               <a:extLst>
                 <a:ext uri="{FF2B5EF4-FFF2-40B4-BE49-F238E27FC236}">
-                  <a16:creationId xmlns:a16="http://schemas.microsoft.com/office/drawing/2014/main" id="{09592E3D-F6C0-461B-8709-73F823E65EF4}"/>
+                  <a16:creationId xmlns:a16="http://schemas.microsoft.com/office/drawing/2014/main" id="{FBEBD5A3-2EB8-48E1-8173-6B16092D82A8}"/>
+                </a:ext>
+              </a:extLst>
+            </p:cNvPr>
+            <p:cNvSpPr/>
+            <p:nvPr/>
+          </p:nvSpPr>
+          <p:spPr>
+            <a:xfrm>
+              <a:off x="770149" y="786158"/>
+              <a:ext cx="242047" cy="225541"/>
+            </a:xfrm>
+            <a:prstGeom prst="ellipse">
+              <a:avLst/>
+            </a:prstGeom>
+            <a:solidFill>
+              <a:schemeClr val="bg1"/>
+            </a:solidFill>
+            <a:ln>
+              <a:noFill/>
+            </a:ln>
+          </p:spPr>
+          <p:style>
+            <a:lnRef idx="2">
+              <a:schemeClr val="accent1">
+                <a:shade val="50000"/>
+              </a:schemeClr>
+            </a:lnRef>
+            <a:fillRef idx="1">
+              <a:schemeClr val="accent1"/>
+            </a:fillRef>
+            <a:effectRef idx="0">
+              <a:schemeClr val="accent1"/>
+            </a:effectRef>
+            <a:fontRef idx="minor">
+              <a:schemeClr val="lt1"/>
+            </a:fontRef>
+          </p:style>
+          <p:txBody>
+            <a:bodyPr rtlCol="0" anchor="ctr"/>
+            <a:lstStyle/>
+            <a:p>
+              <a:pPr algn="ctr"/>
+              <a:endParaRPr lang="en-AU"/>
+            </a:p>
+          </p:txBody>
+        </p:sp>
+        <p:sp>
+          <p:nvSpPr>
+            <p:cNvPr id="22" name="Trapezoid 21">
+              <a:extLst>
+                <a:ext uri="{FF2B5EF4-FFF2-40B4-BE49-F238E27FC236}">
+                  <a16:creationId xmlns:a16="http://schemas.microsoft.com/office/drawing/2014/main" id="{582200FD-F448-4087-8FAA-B2A56E164687}"/>
+                </a:ext>
+              </a:extLst>
+            </p:cNvPr>
+            <p:cNvSpPr/>
+            <p:nvPr/>
+          </p:nvSpPr>
+          <p:spPr>
+            <a:xfrm rot="3507483">
+              <a:off x="598840" y="873088"/>
+              <a:ext cx="248430" cy="247576"/>
+            </a:xfrm>
+            <a:prstGeom prst="trapezoid">
+              <a:avLst>
+                <a:gd name="adj" fmla="val 27118"/>
+              </a:avLst>
+            </a:prstGeom>
+            <a:solidFill>
+              <a:schemeClr val="bg1"/>
+            </a:solidFill>
+            <a:ln>
+              <a:noFill/>
+            </a:ln>
+          </p:spPr>
+          <p:style>
+            <a:lnRef idx="2">
+              <a:schemeClr val="accent1">
+                <a:shade val="50000"/>
+              </a:schemeClr>
+            </a:lnRef>
+            <a:fillRef idx="1">
+              <a:schemeClr val="accent1"/>
+            </a:fillRef>
+            <a:effectRef idx="0">
+              <a:schemeClr val="accent1"/>
+            </a:effectRef>
+            <a:fontRef idx="minor">
+              <a:schemeClr val="lt1"/>
+            </a:fontRef>
+          </p:style>
+          <p:txBody>
+            <a:bodyPr rtlCol="0" anchor="ctr"/>
+            <a:lstStyle/>
+            <a:p>
+              <a:pPr algn="ctr"/>
+              <a:endParaRPr lang="en-AU"/>
+            </a:p>
+          </p:txBody>
+        </p:sp>
+        <p:sp>
+          <p:nvSpPr>
+            <p:cNvPr id="23" name="Trapezoid 22">
+              <a:extLst>
+                <a:ext uri="{FF2B5EF4-FFF2-40B4-BE49-F238E27FC236}">
+                  <a16:creationId xmlns:a16="http://schemas.microsoft.com/office/drawing/2014/main" id="{3BD372E3-2DBC-4C2C-AADE-097E85608AAF}"/>
+                </a:ext>
+              </a:extLst>
+            </p:cNvPr>
+            <p:cNvSpPr/>
+            <p:nvPr/>
+          </p:nvSpPr>
+          <p:spPr>
+            <a:xfrm rot="18126047">
+              <a:off x="920891" y="889621"/>
+              <a:ext cx="249887" cy="198655"/>
+            </a:xfrm>
+            <a:prstGeom prst="trapezoid">
+              <a:avLst/>
+            </a:prstGeom>
+            <a:solidFill>
+              <a:schemeClr val="bg1"/>
+            </a:solidFill>
+            <a:ln>
+              <a:noFill/>
+            </a:ln>
+          </p:spPr>
+          <p:style>
+            <a:lnRef idx="2">
+              <a:schemeClr val="accent1">
+                <a:shade val="50000"/>
+              </a:schemeClr>
+            </a:lnRef>
+            <a:fillRef idx="1">
+              <a:schemeClr val="accent1"/>
+            </a:fillRef>
+            <a:effectRef idx="0">
+              <a:schemeClr val="accent1"/>
+            </a:effectRef>
+            <a:fontRef idx="minor">
+              <a:schemeClr val="lt1"/>
+            </a:fontRef>
+          </p:style>
+          <p:txBody>
+            <a:bodyPr rtlCol="0" anchor="ctr"/>
+            <a:lstStyle/>
+            <a:p>
+              <a:pPr algn="ctr"/>
+              <a:endParaRPr lang="en-AU"/>
+            </a:p>
+          </p:txBody>
+        </p:sp>
+        <p:sp>
+          <p:nvSpPr>
+            <p:cNvPr id="24" name="Trapezoid 23">
+              <a:extLst>
+                <a:ext uri="{FF2B5EF4-FFF2-40B4-BE49-F238E27FC236}">
+                  <a16:creationId xmlns:a16="http://schemas.microsoft.com/office/drawing/2014/main" id="{A3C551DA-149A-4FFB-89CC-2ECDB49A82BD}"/>
                 </a:ext>
               </a:extLst>
             </p:cNvPr>
@@ -4030,13 +4520,63 @@
           </p:nvSpPr>
           <p:spPr>
             <a:xfrm rot="10800000">
-              <a:off x="2616200" y="4627034"/>
-              <a:ext cx="2396067" cy="2099733"/>
+              <a:off x="750287" y="576220"/>
+              <a:ext cx="284611" cy="246516"/>
             </a:xfrm>
-            <a:prstGeom prst="triangle">
-              <a:avLst>
-                <a:gd name="adj" fmla="val 100000"/>
-              </a:avLst>
+            <a:prstGeom prst="trapezoid">
+              <a:avLst/>
+            </a:prstGeom>
+            <a:solidFill>
+              <a:schemeClr val="bg1"/>
+            </a:solidFill>
+            <a:ln>
+              <a:noFill/>
+            </a:ln>
+          </p:spPr>
+          <p:style>
+            <a:lnRef idx="2">
+              <a:schemeClr val="accent1">
+                <a:shade val="50000"/>
+              </a:schemeClr>
+            </a:lnRef>
+            <a:fillRef idx="1">
+              <a:schemeClr val="accent1"/>
+            </a:fillRef>
+            <a:effectRef idx="0">
+              <a:schemeClr val="accent1"/>
+            </a:effectRef>
+            <a:fontRef idx="minor">
+              <a:schemeClr val="lt1"/>
+            </a:fontRef>
+          </p:style>
+          <p:txBody>
+            <a:bodyPr rtlCol="0" anchor="ctr"/>
+            <a:lstStyle/>
+            <a:p>
+              <a:pPr algn="ctr"/>
+              <a:endParaRPr lang="en-AU"/>
+            </a:p>
+          </p:txBody>
+        </p:sp>
+        <p:sp>
+          <p:nvSpPr>
+            <p:cNvPr id="21" name="Oval 20">
+              <a:extLst>
+                <a:ext uri="{FF2B5EF4-FFF2-40B4-BE49-F238E27FC236}">
+                  <a16:creationId xmlns:a16="http://schemas.microsoft.com/office/drawing/2014/main" id="{297C7383-ED8E-4C82-8DE7-AEB96556897B}"/>
+                </a:ext>
+              </a:extLst>
+            </p:cNvPr>
+            <p:cNvSpPr/>
+            <p:nvPr/>
+          </p:nvSpPr>
+          <p:spPr>
+            <a:xfrm>
+              <a:off x="812138" y="819264"/>
+              <a:ext cx="156074" cy="158146"/>
+            </a:xfrm>
+            <a:prstGeom prst="ellipse">
+              <a:avLst/>
             </a:prstGeom>
             <a:solidFill>
               <a:schemeClr val="tx1"/>
@@ -4066,7 +4606,7 @@
             <a:lstStyle/>
             <a:p>
               <a:pPr algn="ctr"/>
-              <a:endParaRPr lang="en-AU" sz="100"/>
+              <a:endParaRPr lang="en-AU"/>
             </a:p>
           </p:txBody>
         </p:sp>
@@ -4101,63 +4641,137 @@
           <a:chExt cx="0" cy="0"/>
         </a:xfrm>
       </p:grpSpPr>
-      <p:sp>
-        <p:nvSpPr>
-          <p:cNvPr id="4" name="Heart 3">
+      <p:grpSp>
+        <p:nvGrpSpPr>
+          <p:cNvPr id="2" name="Group 1">
             <a:extLst>
               <a:ext uri="{FF2B5EF4-FFF2-40B4-BE49-F238E27FC236}">
-                <a16:creationId xmlns:a16="http://schemas.microsoft.com/office/drawing/2014/main" id="{3D02FB7D-6E7A-456C-B3E9-1B3AA22C19B9}"/>
+                <a16:creationId xmlns:a16="http://schemas.microsoft.com/office/drawing/2014/main" id="{BF80A8DF-FCCD-4973-A449-983953C4648E}"/>
               </a:ext>
             </a:extLst>
           </p:cNvPr>
-          <p:cNvSpPr/>
+          <p:cNvGrpSpPr/>
           <p:nvPr/>
-        </p:nvSpPr>
-        <p:spPr>
+        </p:nvGrpSpPr>
+        <p:grpSpPr>
           <a:xfrm>
-            <a:off x="136638" y="243395"/>
-            <a:ext cx="1526948" cy="1313434"/>
+            <a:off x="154379" y="144081"/>
+            <a:ext cx="1491466" cy="1508515"/>
+            <a:chOff x="154379" y="144081"/>
+            <a:chExt cx="1491466" cy="1508515"/>
           </a:xfrm>
-          <a:prstGeom prst="heart">
-            <a:avLst/>
-          </a:prstGeom>
-          <a:solidFill>
-            <a:schemeClr val="tx1"/>
-          </a:solidFill>
-          <a:ln>
-            <a:noFill/>
-          </a:ln>
-          <a:effectLst>
-            <a:glow rad="254000">
+        </p:grpSpPr>
+        <p:sp>
+          <p:nvSpPr>
+            <p:cNvPr id="3" name="Rectangle 2">
+              <a:extLst>
+                <a:ext uri="{FF2B5EF4-FFF2-40B4-BE49-F238E27FC236}">
+                  <a16:creationId xmlns:a16="http://schemas.microsoft.com/office/drawing/2014/main" id="{FC7D14C2-996A-485F-9460-2454927A667E}"/>
+                </a:ext>
+              </a:extLst>
+            </p:cNvPr>
+            <p:cNvSpPr/>
+            <p:nvPr/>
+          </p:nvSpPr>
+          <p:spPr>
+            <a:xfrm>
+              <a:off x="154379" y="144081"/>
+              <a:ext cx="1491466" cy="1508515"/>
+            </a:xfrm>
+            <a:prstGeom prst="rect">
+              <a:avLst/>
+            </a:prstGeom>
+            <a:solidFill>
+              <a:schemeClr val="tx1"/>
+            </a:solidFill>
+            <a:ln>
+              <a:noFill/>
+            </a:ln>
+            <a:effectLst>
+              <a:glow rad="254000">
+                <a:schemeClr val="bg1"/>
+              </a:glow>
+            </a:effectLst>
+          </p:spPr>
+          <p:style>
+            <a:lnRef idx="2">
+              <a:schemeClr val="accent1">
+                <a:shade val="50000"/>
+              </a:schemeClr>
+            </a:lnRef>
+            <a:fillRef idx="1">
+              <a:schemeClr val="accent1"/>
+            </a:fillRef>
+            <a:effectRef idx="0">
+              <a:schemeClr val="accent1"/>
+            </a:effectRef>
+            <a:fontRef idx="minor">
+              <a:schemeClr val="lt1"/>
+            </a:fontRef>
+          </p:style>
+          <p:txBody>
+            <a:bodyPr rtlCol="0" anchor="ctr"/>
+            <a:lstStyle/>
+            <a:p>
+              <a:pPr algn="ctr"/>
+              <a:endParaRPr lang="en-AU"/>
+            </a:p>
+          </p:txBody>
+        </p:sp>
+        <p:sp>
+          <p:nvSpPr>
+            <p:cNvPr id="4" name="Heart 3">
+              <a:extLst>
+                <a:ext uri="{FF2B5EF4-FFF2-40B4-BE49-F238E27FC236}">
+                  <a16:creationId xmlns:a16="http://schemas.microsoft.com/office/drawing/2014/main" id="{3D02FB7D-6E7A-456C-B3E9-1B3AA22C19B9}"/>
+                </a:ext>
+              </a:extLst>
+            </p:cNvPr>
+            <p:cNvSpPr/>
+            <p:nvPr/>
+          </p:nvSpPr>
+          <p:spPr>
+            <a:xfrm>
+              <a:off x="280186" y="383852"/>
+              <a:ext cx="1239852" cy="1104519"/>
+            </a:xfrm>
+            <a:prstGeom prst="heart">
+              <a:avLst/>
+            </a:prstGeom>
+            <a:solidFill>
               <a:schemeClr val="bg1"/>
-            </a:glow>
-          </a:effectLst>
-        </p:spPr>
-        <p:style>
-          <a:lnRef idx="2">
-            <a:schemeClr val="accent1">
-              <a:shade val="50000"/>
-            </a:schemeClr>
-          </a:lnRef>
-          <a:fillRef idx="1">
-            <a:schemeClr val="accent1"/>
-          </a:fillRef>
-          <a:effectRef idx="0">
-            <a:schemeClr val="accent1"/>
-          </a:effectRef>
-          <a:fontRef idx="minor">
-            <a:schemeClr val="lt1"/>
-          </a:fontRef>
-        </p:style>
-        <p:txBody>
-          <a:bodyPr rtlCol="0" anchor="ctr"/>
-          <a:lstStyle/>
-          <a:p>
-            <a:pPr algn="ctr"/>
-            <a:endParaRPr lang="en-AU" sz="100"/>
-          </a:p>
-        </p:txBody>
-      </p:sp>
+            </a:solidFill>
+            <a:ln>
+              <a:noFill/>
+            </a:ln>
+            <a:effectLst/>
+          </p:spPr>
+          <p:style>
+            <a:lnRef idx="2">
+              <a:schemeClr val="accent1">
+                <a:shade val="50000"/>
+              </a:schemeClr>
+            </a:lnRef>
+            <a:fillRef idx="1">
+              <a:schemeClr val="accent1"/>
+            </a:fillRef>
+            <a:effectRef idx="0">
+              <a:schemeClr val="accent1"/>
+            </a:effectRef>
+            <a:fontRef idx="minor">
+              <a:schemeClr val="lt1"/>
+            </a:fontRef>
+          </p:style>
+          <p:txBody>
+            <a:bodyPr rtlCol="0" anchor="ctr"/>
+            <a:lstStyle/>
+            <a:p>
+              <a:pPr algn="ctr"/>
+              <a:endParaRPr lang="en-AU" sz="100"/>
+            </a:p>
+          </p:txBody>
+        </p:sp>
+      </p:grpSp>
     </p:spTree>
     <p:extLst>
       <p:ext uri="{BB962C8B-B14F-4D97-AF65-F5344CB8AC3E}">

</xml_diff>

<commit_message>
Added vehicle icons. Allows user to skip logo and title scenes. Main menu is now functional: users can choose number of players and type of vehicle. Improved homing missile. Added singleton for StatePlayer - now all references to names, vehicle types, lives left comes from this central autoloaded script. Added draft version_history readme.
</commit_message>
<xml_diff>
--- a/assets/display/icons/icons.pptx
+++ b/assets/display/icons/icons.pptx
@@ -10,6 +10,8 @@
     <p:sldId id="260" r:id="rId4"/>
     <p:sldId id="259" r:id="rId5"/>
     <p:sldId id="261" r:id="rId6"/>
+    <p:sldId id="262" r:id="rId7"/>
+    <p:sldId id="263" r:id="rId8"/>
   </p:sldIdLst>
   <p:sldSz cx="1800225" cy="1800225"/>
   <p:notesSz cx="6858000" cy="9144000"/>
@@ -247,7 +249,7 @@
           <a:p>
             <a:fld id="{83B0DD9A-6AEE-4CA7-A9F6-A1A12CF444F7}" type="datetimeFigureOut">
               <a:rPr lang="en-AU" smtClean="0"/>
-              <a:t>26/01/2022</a:t>
+              <a:t>30/05/2022</a:t>
             </a:fld>
             <a:endParaRPr lang="en-AU"/>
           </a:p>
@@ -417,7 +419,7 @@
           <a:p>
             <a:fld id="{83B0DD9A-6AEE-4CA7-A9F6-A1A12CF444F7}" type="datetimeFigureOut">
               <a:rPr lang="en-AU" smtClean="0"/>
-              <a:t>26/01/2022</a:t>
+              <a:t>30/05/2022</a:t>
             </a:fld>
             <a:endParaRPr lang="en-AU"/>
           </a:p>
@@ -597,7 +599,7 @@
           <a:p>
             <a:fld id="{83B0DD9A-6AEE-4CA7-A9F6-A1A12CF444F7}" type="datetimeFigureOut">
               <a:rPr lang="en-AU" smtClean="0"/>
-              <a:t>26/01/2022</a:t>
+              <a:t>30/05/2022</a:t>
             </a:fld>
             <a:endParaRPr lang="en-AU"/>
           </a:p>
@@ -767,7 +769,7 @@
           <a:p>
             <a:fld id="{83B0DD9A-6AEE-4CA7-A9F6-A1A12CF444F7}" type="datetimeFigureOut">
               <a:rPr lang="en-AU" smtClean="0"/>
-              <a:t>26/01/2022</a:t>
+              <a:t>30/05/2022</a:t>
             </a:fld>
             <a:endParaRPr lang="en-AU"/>
           </a:p>
@@ -1011,7 +1013,7 @@
           <a:p>
             <a:fld id="{83B0DD9A-6AEE-4CA7-A9F6-A1A12CF444F7}" type="datetimeFigureOut">
               <a:rPr lang="en-AU" smtClean="0"/>
-              <a:t>26/01/2022</a:t>
+              <a:t>30/05/2022</a:t>
             </a:fld>
             <a:endParaRPr lang="en-AU"/>
           </a:p>
@@ -1243,7 +1245,7 @@
           <a:p>
             <a:fld id="{83B0DD9A-6AEE-4CA7-A9F6-A1A12CF444F7}" type="datetimeFigureOut">
               <a:rPr lang="en-AU" smtClean="0"/>
-              <a:t>26/01/2022</a:t>
+              <a:t>30/05/2022</a:t>
             </a:fld>
             <a:endParaRPr lang="en-AU"/>
           </a:p>
@@ -1610,7 +1612,7 @@
           <a:p>
             <a:fld id="{83B0DD9A-6AEE-4CA7-A9F6-A1A12CF444F7}" type="datetimeFigureOut">
               <a:rPr lang="en-AU" smtClean="0"/>
-              <a:t>26/01/2022</a:t>
+              <a:t>30/05/2022</a:t>
             </a:fld>
             <a:endParaRPr lang="en-AU"/>
           </a:p>
@@ -1728,7 +1730,7 @@
           <a:p>
             <a:fld id="{83B0DD9A-6AEE-4CA7-A9F6-A1A12CF444F7}" type="datetimeFigureOut">
               <a:rPr lang="en-AU" smtClean="0"/>
-              <a:t>26/01/2022</a:t>
+              <a:t>30/05/2022</a:t>
             </a:fld>
             <a:endParaRPr lang="en-AU"/>
           </a:p>
@@ -1823,7 +1825,7 @@
           <a:p>
             <a:fld id="{83B0DD9A-6AEE-4CA7-A9F6-A1A12CF444F7}" type="datetimeFigureOut">
               <a:rPr lang="en-AU" smtClean="0"/>
-              <a:t>26/01/2022</a:t>
+              <a:t>30/05/2022</a:t>
             </a:fld>
             <a:endParaRPr lang="en-AU"/>
           </a:p>
@@ -2100,7 +2102,7 @@
           <a:p>
             <a:fld id="{83B0DD9A-6AEE-4CA7-A9F6-A1A12CF444F7}" type="datetimeFigureOut">
               <a:rPr lang="en-AU" smtClean="0"/>
-              <a:t>26/01/2022</a:t>
+              <a:t>30/05/2022</a:t>
             </a:fld>
             <a:endParaRPr lang="en-AU"/>
           </a:p>
@@ -2357,7 +2359,7 @@
           <a:p>
             <a:fld id="{83B0DD9A-6AEE-4CA7-A9F6-A1A12CF444F7}" type="datetimeFigureOut">
               <a:rPr lang="en-AU" smtClean="0"/>
-              <a:t>26/01/2022</a:t>
+              <a:t>30/05/2022</a:t>
             </a:fld>
             <a:endParaRPr lang="en-AU"/>
           </a:p>
@@ -2570,7 +2572,7 @@
           <a:p>
             <a:fld id="{83B0DD9A-6AEE-4CA7-A9F6-A1A12CF444F7}" type="datetimeFigureOut">
               <a:rPr lang="en-AU" smtClean="0"/>
-              <a:t>26/01/2022</a:t>
+              <a:t>30/05/2022</a:t>
             </a:fld>
             <a:endParaRPr lang="en-AU"/>
           </a:p>
@@ -4785,6 +4787,167 @@
 </p:sld>
 </file>
 
+<file path=ppt/slides/slide6.xml><?xml version="1.0" encoding="utf-8"?>
+<p:sld xmlns:a="http://schemas.openxmlformats.org/drawingml/2006/main" xmlns:r="http://schemas.openxmlformats.org/officeDocument/2006/relationships" xmlns:p="http://schemas.openxmlformats.org/presentationml/2006/main">
+  <p:cSld>
+    <p:spTree>
+      <p:nvGrpSpPr>
+        <p:cNvPr id="1" name=""/>
+        <p:cNvGrpSpPr/>
+        <p:nvPr/>
+      </p:nvGrpSpPr>
+      <p:grpSpPr>
+        <a:xfrm>
+          <a:off x="0" y="0"/>
+          <a:ext cx="0" cy="0"/>
+          <a:chOff x="0" y="0"/>
+          <a:chExt cx="0" cy="0"/>
+        </a:xfrm>
+      </p:grpSpPr>
+      <p:sp>
+        <p:nvSpPr>
+          <p:cNvPr id="4" name="Rectangle: Rounded Corners 3">
+            <a:extLst>
+              <a:ext uri="{FF2B5EF4-FFF2-40B4-BE49-F238E27FC236}">
+                <a16:creationId xmlns:a16="http://schemas.microsoft.com/office/drawing/2014/main" id="{02CE623C-D2C8-8E91-2430-8E6623F89697}"/>
+              </a:ext>
+            </a:extLst>
+          </p:cNvPr>
+          <p:cNvSpPr/>
+          <p:nvPr/>
+        </p:nvSpPr>
+        <p:spPr>
+          <a:xfrm>
+            <a:off x="180112" y="207488"/>
+            <a:ext cx="1440000" cy="1440000"/>
+          </a:xfrm>
+          <a:prstGeom prst="roundRect">
+            <a:avLst>
+              <a:gd name="adj" fmla="val 0"/>
+            </a:avLst>
+          </a:prstGeom>
+          <a:noFill/>
+          <a:ln w="25400">
+            <a:solidFill>
+              <a:schemeClr val="tx1"/>
+            </a:solidFill>
+            <a:prstDash val="sysDash"/>
+          </a:ln>
+        </p:spPr>
+        <p:style>
+          <a:lnRef idx="2">
+            <a:schemeClr val="accent1">
+              <a:shade val="50000"/>
+            </a:schemeClr>
+          </a:lnRef>
+          <a:fillRef idx="1">
+            <a:schemeClr val="accent1"/>
+          </a:fillRef>
+          <a:effectRef idx="0">
+            <a:schemeClr val="accent1"/>
+          </a:effectRef>
+          <a:fontRef idx="minor">
+            <a:schemeClr val="lt1"/>
+          </a:fontRef>
+        </p:style>
+        <p:txBody>
+          <a:bodyPr rtlCol="0" anchor="ctr"/>
+          <a:lstStyle/>
+          <a:p>
+            <a:pPr algn="ctr"/>
+            <a:endParaRPr lang="en-AU"/>
+          </a:p>
+        </p:txBody>
+      </p:sp>
+    </p:spTree>
+    <p:extLst>
+      <p:ext uri="{BB962C8B-B14F-4D97-AF65-F5344CB8AC3E}">
+        <p14:creationId xmlns:p14="http://schemas.microsoft.com/office/powerpoint/2010/main" val="1086127251"/>
+      </p:ext>
+    </p:extLst>
+  </p:cSld>
+  <p:clrMapOvr>
+    <a:masterClrMapping/>
+  </p:clrMapOvr>
+</p:sld>
+</file>
+
+<file path=ppt/slides/slide7.xml><?xml version="1.0" encoding="utf-8"?>
+<p:sld xmlns:a="http://schemas.openxmlformats.org/drawingml/2006/main" xmlns:r="http://schemas.openxmlformats.org/officeDocument/2006/relationships" xmlns:p="http://schemas.openxmlformats.org/presentationml/2006/main">
+  <p:cSld>
+    <p:spTree>
+      <p:nvGrpSpPr>
+        <p:cNvPr id="1" name=""/>
+        <p:cNvGrpSpPr/>
+        <p:nvPr/>
+      </p:nvGrpSpPr>
+      <p:grpSpPr>
+        <a:xfrm>
+          <a:off x="0" y="0"/>
+          <a:ext cx="0" cy="0"/>
+          <a:chOff x="0" y="0"/>
+          <a:chExt cx="0" cy="0"/>
+        </a:xfrm>
+      </p:grpSpPr>
+      <p:pic>
+        <p:nvPicPr>
+          <p:cNvPr id="5" name="Picture 4" descr="Icon&#10;&#10;Description automatically generated">
+            <a:extLst>
+              <a:ext uri="{FF2B5EF4-FFF2-40B4-BE49-F238E27FC236}">
+                <a16:creationId xmlns:a16="http://schemas.microsoft.com/office/drawing/2014/main" id="{202D2FEC-DC5A-E1E7-B487-6BD8777A9135}"/>
+              </a:ext>
+            </a:extLst>
+          </p:cNvPr>
+          <p:cNvPicPr>
+            <a:picLocks noChangeAspect="1"/>
+          </p:cNvPicPr>
+          <p:nvPr/>
+        </p:nvPicPr>
+        <p:blipFill>
+          <a:blip r:embed="rId2">
+            <a:clrChange>
+              <a:clrFrom>
+                <a:srgbClr val="FFFFFF"/>
+              </a:clrFrom>
+              <a:clrTo>
+                <a:srgbClr val="FFFFFF">
+                  <a:alpha val="0"/>
+                </a:srgbClr>
+              </a:clrTo>
+            </a:clrChange>
+            <a:extLst>
+              <a:ext uri="{28A0092B-C50C-407E-A947-70E740481C1C}">
+                <a14:useLocalDpi xmlns:a14="http://schemas.microsoft.com/office/drawing/2010/main" val="0"/>
+              </a:ext>
+            </a:extLst>
+          </a:blip>
+          <a:stretch>
+            <a:fillRect/>
+          </a:stretch>
+        </p:blipFill>
+        <p:spPr>
+          <a:xfrm>
+            <a:off x="0" y="0"/>
+            <a:ext cx="1800225" cy="1800225"/>
+          </a:xfrm>
+          <a:prstGeom prst="rect">
+            <a:avLst/>
+          </a:prstGeom>
+        </p:spPr>
+      </p:pic>
+    </p:spTree>
+    <p:extLst>
+      <p:ext uri="{BB962C8B-B14F-4D97-AF65-F5344CB8AC3E}">
+        <p14:creationId xmlns:p14="http://schemas.microsoft.com/office/powerpoint/2010/main" val="3479759799"/>
+      </p:ext>
+    </p:extLst>
+  </p:cSld>
+  <p:clrMapOvr>
+    <a:masterClrMapping/>
+  </p:clrMapOvr>
+</p:sld>
+</file>
+
 <file path=ppt/theme/theme1.xml><?xml version="1.0" encoding="utf-8"?>
 <a:theme xmlns:a="http://schemas.openxmlformats.org/drawingml/2006/main" name="Office Theme">
   <a:themeElements>

</xml_diff>

<commit_message>
Fixed tank and truck bug where they couldn't accelerate when going slowly backwards: fix was changing fwd_mps to abs(fwd)mps) for engine_force - simple.
</commit_message>
<xml_diff>
--- a/assets/display/icons/icons.pptx
+++ b/assets/display/icons/icons.pptx
@@ -6,12 +6,14 @@
   </p:sldMasterIdLst>
   <p:sldIdLst>
     <p:sldId id="256" r:id="rId2"/>
-    <p:sldId id="257" r:id="rId3"/>
-    <p:sldId id="260" r:id="rId4"/>
-    <p:sldId id="259" r:id="rId5"/>
-    <p:sldId id="261" r:id="rId6"/>
-    <p:sldId id="262" r:id="rId7"/>
-    <p:sldId id="263" r:id="rId8"/>
+    <p:sldId id="264" r:id="rId3"/>
+    <p:sldId id="265" r:id="rId4"/>
+    <p:sldId id="257" r:id="rId5"/>
+    <p:sldId id="260" r:id="rId6"/>
+    <p:sldId id="259" r:id="rId7"/>
+    <p:sldId id="261" r:id="rId8"/>
+    <p:sldId id="262" r:id="rId9"/>
+    <p:sldId id="263" r:id="rId10"/>
   </p:sldIdLst>
   <p:sldSz cx="1800225" cy="1800225"/>
   <p:notesSz cx="6858000" cy="9144000"/>
@@ -249,7 +251,7 @@
           <a:p>
             <a:fld id="{83B0DD9A-6AEE-4CA7-A9F6-A1A12CF444F7}" type="datetimeFigureOut">
               <a:rPr lang="en-AU" smtClean="0"/>
-              <a:t>30/05/2022</a:t>
+              <a:t>16/06/2022</a:t>
             </a:fld>
             <a:endParaRPr lang="en-AU"/>
           </a:p>
@@ -419,7 +421,7 @@
           <a:p>
             <a:fld id="{83B0DD9A-6AEE-4CA7-A9F6-A1A12CF444F7}" type="datetimeFigureOut">
               <a:rPr lang="en-AU" smtClean="0"/>
-              <a:t>30/05/2022</a:t>
+              <a:t>16/06/2022</a:t>
             </a:fld>
             <a:endParaRPr lang="en-AU"/>
           </a:p>
@@ -599,7 +601,7 @@
           <a:p>
             <a:fld id="{83B0DD9A-6AEE-4CA7-A9F6-A1A12CF444F7}" type="datetimeFigureOut">
               <a:rPr lang="en-AU" smtClean="0"/>
-              <a:t>30/05/2022</a:t>
+              <a:t>16/06/2022</a:t>
             </a:fld>
             <a:endParaRPr lang="en-AU"/>
           </a:p>
@@ -769,7 +771,7 @@
           <a:p>
             <a:fld id="{83B0DD9A-6AEE-4CA7-A9F6-A1A12CF444F7}" type="datetimeFigureOut">
               <a:rPr lang="en-AU" smtClean="0"/>
-              <a:t>30/05/2022</a:t>
+              <a:t>16/06/2022</a:t>
             </a:fld>
             <a:endParaRPr lang="en-AU"/>
           </a:p>
@@ -1013,7 +1015,7 @@
           <a:p>
             <a:fld id="{83B0DD9A-6AEE-4CA7-A9F6-A1A12CF444F7}" type="datetimeFigureOut">
               <a:rPr lang="en-AU" smtClean="0"/>
-              <a:t>30/05/2022</a:t>
+              <a:t>16/06/2022</a:t>
             </a:fld>
             <a:endParaRPr lang="en-AU"/>
           </a:p>
@@ -1245,7 +1247,7 @@
           <a:p>
             <a:fld id="{83B0DD9A-6AEE-4CA7-A9F6-A1A12CF444F7}" type="datetimeFigureOut">
               <a:rPr lang="en-AU" smtClean="0"/>
-              <a:t>30/05/2022</a:t>
+              <a:t>16/06/2022</a:t>
             </a:fld>
             <a:endParaRPr lang="en-AU"/>
           </a:p>
@@ -1612,7 +1614,7 @@
           <a:p>
             <a:fld id="{83B0DD9A-6AEE-4CA7-A9F6-A1A12CF444F7}" type="datetimeFigureOut">
               <a:rPr lang="en-AU" smtClean="0"/>
-              <a:t>30/05/2022</a:t>
+              <a:t>16/06/2022</a:t>
             </a:fld>
             <a:endParaRPr lang="en-AU"/>
           </a:p>
@@ -1730,7 +1732,7 @@
           <a:p>
             <a:fld id="{83B0DD9A-6AEE-4CA7-A9F6-A1A12CF444F7}" type="datetimeFigureOut">
               <a:rPr lang="en-AU" smtClean="0"/>
-              <a:t>30/05/2022</a:t>
+              <a:t>16/06/2022</a:t>
             </a:fld>
             <a:endParaRPr lang="en-AU"/>
           </a:p>
@@ -1825,7 +1827,7 @@
           <a:p>
             <a:fld id="{83B0DD9A-6AEE-4CA7-A9F6-A1A12CF444F7}" type="datetimeFigureOut">
               <a:rPr lang="en-AU" smtClean="0"/>
-              <a:t>30/05/2022</a:t>
+              <a:t>16/06/2022</a:t>
             </a:fld>
             <a:endParaRPr lang="en-AU"/>
           </a:p>
@@ -2102,7 +2104,7 @@
           <a:p>
             <a:fld id="{83B0DD9A-6AEE-4CA7-A9F6-A1A12CF444F7}" type="datetimeFigureOut">
               <a:rPr lang="en-AU" smtClean="0"/>
-              <a:t>30/05/2022</a:t>
+              <a:t>16/06/2022</a:t>
             </a:fld>
             <a:endParaRPr lang="en-AU"/>
           </a:p>
@@ -2359,7 +2361,7 @@
           <a:p>
             <a:fld id="{83B0DD9A-6AEE-4CA7-A9F6-A1A12CF444F7}" type="datetimeFigureOut">
               <a:rPr lang="en-AU" smtClean="0"/>
-              <a:t>30/05/2022</a:t>
+              <a:t>16/06/2022</a:t>
             </a:fld>
             <a:endParaRPr lang="en-AU"/>
           </a:p>
@@ -2572,7 +2574,7 @@
           <a:p>
             <a:fld id="{83B0DD9A-6AEE-4CA7-A9F6-A1A12CF444F7}" type="datetimeFigureOut">
               <a:rPr lang="en-AU" smtClean="0"/>
-              <a:t>30/05/2022</a:t>
+              <a:t>16/06/2022</a:t>
             </a:fld>
             <a:endParaRPr lang="en-AU"/>
           </a:p>
@@ -3316,6 +3318,761 @@
       </p:grpSpPr>
       <p:grpSp>
         <p:nvGrpSpPr>
+          <p:cNvPr id="9" name="Group 8">
+            <a:extLst>
+              <a:ext uri="{FF2B5EF4-FFF2-40B4-BE49-F238E27FC236}">
+                <a16:creationId xmlns:a16="http://schemas.microsoft.com/office/drawing/2014/main" id="{393EA8FC-A438-4DAD-A577-E7AE83AB2F63}"/>
+              </a:ext>
+            </a:extLst>
+          </p:cNvPr>
+          <p:cNvGrpSpPr/>
+          <p:nvPr/>
+        </p:nvGrpSpPr>
+        <p:grpSpPr>
+          <a:xfrm rot="16200000">
+            <a:off x="209870" y="116375"/>
+            <a:ext cx="1491466" cy="1567474"/>
+            <a:chOff x="154379" y="154327"/>
+            <a:chExt cx="1491466" cy="1567474"/>
+          </a:xfrm>
+        </p:grpSpPr>
+        <p:sp>
+          <p:nvSpPr>
+            <p:cNvPr id="2" name="Rectangle 1">
+              <a:extLst>
+                <a:ext uri="{FF2B5EF4-FFF2-40B4-BE49-F238E27FC236}">
+                  <a16:creationId xmlns:a16="http://schemas.microsoft.com/office/drawing/2014/main" id="{EDA52ACA-6D24-4AED-89E1-130423820807}"/>
+                </a:ext>
+              </a:extLst>
+            </p:cNvPr>
+            <p:cNvSpPr/>
+            <p:nvPr/>
+          </p:nvSpPr>
+          <p:spPr>
+            <a:xfrm>
+              <a:off x="154379" y="154327"/>
+              <a:ext cx="1491466" cy="1491570"/>
+            </a:xfrm>
+            <a:prstGeom prst="rect">
+              <a:avLst/>
+            </a:prstGeom>
+            <a:solidFill>
+              <a:schemeClr val="tx1"/>
+            </a:solidFill>
+            <a:ln>
+              <a:noFill/>
+            </a:ln>
+            <a:effectLst>
+              <a:glow rad="254000">
+                <a:schemeClr val="bg1"/>
+              </a:glow>
+            </a:effectLst>
+          </p:spPr>
+          <p:style>
+            <a:lnRef idx="2">
+              <a:schemeClr val="accent1">
+                <a:shade val="50000"/>
+              </a:schemeClr>
+            </a:lnRef>
+            <a:fillRef idx="1">
+              <a:schemeClr val="accent1"/>
+            </a:fillRef>
+            <a:effectRef idx="0">
+              <a:schemeClr val="accent1"/>
+            </a:effectRef>
+            <a:fontRef idx="minor">
+              <a:schemeClr val="lt1"/>
+            </a:fontRef>
+          </p:style>
+          <p:txBody>
+            <a:bodyPr rtlCol="0" anchor="ctr"/>
+            <a:lstStyle/>
+            <a:p>
+              <a:pPr algn="ctr"/>
+              <a:endParaRPr lang="en-AU"/>
+            </a:p>
+          </p:txBody>
+        </p:sp>
+        <p:grpSp>
+          <p:nvGrpSpPr>
+            <p:cNvPr id="39" name="Group 38">
+              <a:extLst>
+                <a:ext uri="{FF2B5EF4-FFF2-40B4-BE49-F238E27FC236}">
+                  <a16:creationId xmlns:a16="http://schemas.microsoft.com/office/drawing/2014/main" id="{4F4DD76A-382E-46D9-A840-1AA73730AA44}"/>
+                </a:ext>
+              </a:extLst>
+            </p:cNvPr>
+            <p:cNvGrpSpPr/>
+            <p:nvPr/>
+          </p:nvGrpSpPr>
+          <p:grpSpPr>
+            <a:xfrm rot="2748745">
+              <a:off x="322834" y="416540"/>
+              <a:ext cx="1395502" cy="1215020"/>
+              <a:chOff x="1863747" y="561351"/>
+              <a:chExt cx="10185405" cy="6595524"/>
+            </a:xfrm>
+            <a:solidFill>
+              <a:schemeClr val="bg1"/>
+            </a:solidFill>
+            <a:effectLst/>
+          </p:grpSpPr>
+          <p:sp>
+            <p:nvSpPr>
+              <p:cNvPr id="4" name="Rectangle 3">
+                <a:extLst>
+                  <a:ext uri="{FF2B5EF4-FFF2-40B4-BE49-F238E27FC236}">
+                    <a16:creationId xmlns:a16="http://schemas.microsoft.com/office/drawing/2014/main" id="{ED4C6AF5-E0CD-4909-A091-D24C7B5ADFEC}"/>
+                  </a:ext>
+                </a:extLst>
+              </p:cNvPr>
+              <p:cNvSpPr/>
+              <p:nvPr/>
+            </p:nvSpPr>
+            <p:spPr>
+              <a:xfrm>
+                <a:off x="1863747" y="2661075"/>
+                <a:ext cx="7662334" cy="2396068"/>
+              </a:xfrm>
+              <a:prstGeom prst="rect">
+                <a:avLst/>
+              </a:prstGeom>
+              <a:grpFill/>
+              <a:ln>
+                <a:noFill/>
+              </a:ln>
+            </p:spPr>
+            <p:style>
+              <a:lnRef idx="2">
+                <a:schemeClr val="accent1">
+                  <a:shade val="50000"/>
+                </a:schemeClr>
+              </a:lnRef>
+              <a:fillRef idx="1">
+                <a:schemeClr val="accent1"/>
+              </a:fillRef>
+              <a:effectRef idx="0">
+                <a:schemeClr val="accent1"/>
+              </a:effectRef>
+              <a:fontRef idx="minor">
+                <a:schemeClr val="lt1"/>
+              </a:fontRef>
+            </p:style>
+            <p:txBody>
+              <a:bodyPr rtlCol="0" anchor="ctr"/>
+              <a:lstStyle/>
+              <a:p>
+                <a:pPr algn="ctr"/>
+                <a:endParaRPr lang="en-AU" sz="100"/>
+              </a:p>
+            </p:txBody>
+          </p:sp>
+          <p:sp>
+            <p:nvSpPr>
+              <p:cNvPr id="5" name="Isosceles Triangle 4">
+                <a:extLst>
+                  <a:ext uri="{FF2B5EF4-FFF2-40B4-BE49-F238E27FC236}">
+                    <a16:creationId xmlns:a16="http://schemas.microsoft.com/office/drawing/2014/main" id="{6DBC495A-5066-41BB-9D6B-19616BA35479}"/>
+                  </a:ext>
+                </a:extLst>
+              </p:cNvPr>
+              <p:cNvSpPr/>
+              <p:nvPr/>
+            </p:nvSpPr>
+            <p:spPr>
+              <a:xfrm rot="5400000">
+                <a:off x="9801253" y="2809245"/>
+                <a:ext cx="2396068" cy="2099731"/>
+              </a:xfrm>
+              <a:prstGeom prst="triangle">
+                <a:avLst/>
+              </a:prstGeom>
+              <a:grpFill/>
+              <a:ln>
+                <a:noFill/>
+              </a:ln>
+            </p:spPr>
+            <p:style>
+              <a:lnRef idx="2">
+                <a:schemeClr val="accent1">
+                  <a:shade val="50000"/>
+                </a:schemeClr>
+              </a:lnRef>
+              <a:fillRef idx="1">
+                <a:schemeClr val="accent1"/>
+              </a:fillRef>
+              <a:effectRef idx="0">
+                <a:schemeClr val="accent1"/>
+              </a:effectRef>
+              <a:fontRef idx="minor">
+                <a:schemeClr val="lt1"/>
+              </a:fontRef>
+            </p:style>
+            <p:txBody>
+              <a:bodyPr rtlCol="0" anchor="ctr"/>
+              <a:lstStyle/>
+              <a:p>
+                <a:pPr algn="ctr"/>
+                <a:endParaRPr lang="en-AU" sz="100"/>
+              </a:p>
+            </p:txBody>
+          </p:sp>
+          <p:sp>
+            <p:nvSpPr>
+              <p:cNvPr id="6" name="Isosceles Triangle 5">
+                <a:extLst>
+                  <a:ext uri="{FF2B5EF4-FFF2-40B4-BE49-F238E27FC236}">
+                    <a16:creationId xmlns:a16="http://schemas.microsoft.com/office/drawing/2014/main" id="{50049509-024F-43EA-A614-2C31B6803B8F}"/>
+                  </a:ext>
+                </a:extLst>
+              </p:cNvPr>
+              <p:cNvSpPr/>
+              <p:nvPr/>
+            </p:nvSpPr>
+            <p:spPr>
+              <a:xfrm>
+                <a:off x="3125278" y="561351"/>
+                <a:ext cx="2396067" cy="2099731"/>
+              </a:xfrm>
+              <a:prstGeom prst="triangle">
+                <a:avLst>
+                  <a:gd name="adj" fmla="val 5040"/>
+                </a:avLst>
+              </a:prstGeom>
+              <a:grpFill/>
+              <a:ln>
+                <a:noFill/>
+              </a:ln>
+            </p:spPr>
+            <p:style>
+              <a:lnRef idx="2">
+                <a:schemeClr val="accent1">
+                  <a:shade val="50000"/>
+                </a:schemeClr>
+              </a:lnRef>
+              <a:fillRef idx="1">
+                <a:schemeClr val="accent1"/>
+              </a:fillRef>
+              <a:effectRef idx="0">
+                <a:schemeClr val="accent1"/>
+              </a:effectRef>
+              <a:fontRef idx="minor">
+                <a:schemeClr val="lt1"/>
+              </a:fontRef>
+            </p:style>
+            <p:txBody>
+              <a:bodyPr rtlCol="0" anchor="ctr"/>
+              <a:lstStyle/>
+              <a:p>
+                <a:pPr algn="ctr"/>
+                <a:endParaRPr lang="en-AU" sz="100"/>
+              </a:p>
+            </p:txBody>
+          </p:sp>
+          <p:sp>
+            <p:nvSpPr>
+              <p:cNvPr id="7" name="Isosceles Triangle 6">
+                <a:extLst>
+                  <a:ext uri="{FF2B5EF4-FFF2-40B4-BE49-F238E27FC236}">
+                    <a16:creationId xmlns:a16="http://schemas.microsoft.com/office/drawing/2014/main" id="{09592E3D-F6C0-461B-8709-73F823E65EF4}"/>
+                  </a:ext>
+                </a:extLst>
+              </p:cNvPr>
+              <p:cNvSpPr/>
+              <p:nvPr/>
+            </p:nvSpPr>
+            <p:spPr>
+              <a:xfrm rot="10800000">
+                <a:off x="3125283" y="5057144"/>
+                <a:ext cx="2396067" cy="2099731"/>
+              </a:xfrm>
+              <a:prstGeom prst="triangle">
+                <a:avLst>
+                  <a:gd name="adj" fmla="val 100000"/>
+                </a:avLst>
+              </a:prstGeom>
+              <a:grpFill/>
+              <a:ln>
+                <a:noFill/>
+              </a:ln>
+            </p:spPr>
+            <p:style>
+              <a:lnRef idx="2">
+                <a:schemeClr val="accent1">
+                  <a:shade val="50000"/>
+                </a:schemeClr>
+              </a:lnRef>
+              <a:fillRef idx="1">
+                <a:schemeClr val="accent1"/>
+              </a:fillRef>
+              <a:effectRef idx="0">
+                <a:schemeClr val="accent1"/>
+              </a:effectRef>
+              <a:fontRef idx="minor">
+                <a:schemeClr val="lt1"/>
+              </a:fontRef>
+            </p:style>
+            <p:txBody>
+              <a:bodyPr rtlCol="0" anchor="ctr"/>
+              <a:lstStyle/>
+              <a:p>
+                <a:pPr algn="ctr"/>
+                <a:endParaRPr lang="en-AU" sz="100"/>
+              </a:p>
+            </p:txBody>
+          </p:sp>
+        </p:grpSp>
+      </p:grpSp>
+    </p:spTree>
+    <p:extLst>
+      <p:ext uri="{BB962C8B-B14F-4D97-AF65-F5344CB8AC3E}">
+        <p14:creationId xmlns:p14="http://schemas.microsoft.com/office/powerpoint/2010/main" val="2284669289"/>
+      </p:ext>
+    </p:extLst>
+  </p:cSld>
+  <p:clrMapOvr>
+    <a:masterClrMapping/>
+  </p:clrMapOvr>
+</p:sld>
+</file>
+
+<file path=ppt/slides/slide3.xml><?xml version="1.0" encoding="utf-8"?>
+<p:sld xmlns:a="http://schemas.openxmlformats.org/drawingml/2006/main" xmlns:r="http://schemas.openxmlformats.org/officeDocument/2006/relationships" xmlns:p="http://schemas.openxmlformats.org/presentationml/2006/main">
+  <p:cSld>
+    <p:spTree>
+      <p:nvGrpSpPr>
+        <p:cNvPr id="1" name=""/>
+        <p:cNvGrpSpPr/>
+        <p:nvPr/>
+      </p:nvGrpSpPr>
+      <p:grpSpPr>
+        <a:xfrm>
+          <a:off x="0" y="0"/>
+          <a:ext cx="0" cy="0"/>
+          <a:chOff x="0" y="0"/>
+          <a:chExt cx="0" cy="0"/>
+        </a:xfrm>
+      </p:grpSpPr>
+      <p:grpSp>
+        <p:nvGrpSpPr>
+          <p:cNvPr id="9" name="Group 8">
+            <a:extLst>
+              <a:ext uri="{FF2B5EF4-FFF2-40B4-BE49-F238E27FC236}">
+                <a16:creationId xmlns:a16="http://schemas.microsoft.com/office/drawing/2014/main" id="{393EA8FC-A438-4DAD-A577-E7AE83AB2F63}"/>
+              </a:ext>
+            </a:extLst>
+          </p:cNvPr>
+          <p:cNvGrpSpPr/>
+          <p:nvPr/>
+        </p:nvGrpSpPr>
+        <p:grpSpPr>
+          <a:xfrm rot="16200000">
+            <a:off x="96156" y="-162935"/>
+            <a:ext cx="1491466" cy="2068190"/>
+            <a:chOff x="154379" y="-202506"/>
+            <a:chExt cx="1491466" cy="2068190"/>
+          </a:xfrm>
+        </p:grpSpPr>
+        <p:sp>
+          <p:nvSpPr>
+            <p:cNvPr id="2" name="Rectangle 1">
+              <a:extLst>
+                <a:ext uri="{FF2B5EF4-FFF2-40B4-BE49-F238E27FC236}">
+                  <a16:creationId xmlns:a16="http://schemas.microsoft.com/office/drawing/2014/main" id="{EDA52ACA-6D24-4AED-89E1-130423820807}"/>
+                </a:ext>
+              </a:extLst>
+            </p:cNvPr>
+            <p:cNvSpPr/>
+            <p:nvPr/>
+          </p:nvSpPr>
+          <p:spPr>
+            <a:xfrm>
+              <a:off x="154379" y="154327"/>
+              <a:ext cx="1491466" cy="1491570"/>
+            </a:xfrm>
+            <a:prstGeom prst="rect">
+              <a:avLst/>
+            </a:prstGeom>
+            <a:solidFill>
+              <a:schemeClr val="tx1"/>
+            </a:solidFill>
+            <a:ln>
+              <a:noFill/>
+            </a:ln>
+            <a:effectLst>
+              <a:glow rad="254000">
+                <a:schemeClr val="bg1"/>
+              </a:glow>
+            </a:effectLst>
+          </p:spPr>
+          <p:style>
+            <a:lnRef idx="2">
+              <a:schemeClr val="accent1">
+                <a:shade val="50000"/>
+              </a:schemeClr>
+            </a:lnRef>
+            <a:fillRef idx="1">
+              <a:schemeClr val="accent1"/>
+            </a:fillRef>
+            <a:effectRef idx="0">
+              <a:schemeClr val="accent1"/>
+            </a:effectRef>
+            <a:fontRef idx="minor">
+              <a:schemeClr val="lt1"/>
+            </a:fontRef>
+          </p:style>
+          <p:txBody>
+            <a:bodyPr rtlCol="0" anchor="ctr"/>
+            <a:lstStyle/>
+            <a:p>
+              <a:pPr algn="ctr"/>
+              <a:endParaRPr lang="en-AU"/>
+            </a:p>
+          </p:txBody>
+        </p:sp>
+        <p:grpSp>
+          <p:nvGrpSpPr>
+            <p:cNvPr id="39" name="Group 38">
+              <a:extLst>
+                <a:ext uri="{FF2B5EF4-FFF2-40B4-BE49-F238E27FC236}">
+                  <a16:creationId xmlns:a16="http://schemas.microsoft.com/office/drawing/2014/main" id="{4F4DD76A-382E-46D9-A840-1AA73730AA44}"/>
+                </a:ext>
+              </a:extLst>
+            </p:cNvPr>
+            <p:cNvGrpSpPr/>
+            <p:nvPr/>
+          </p:nvGrpSpPr>
+          <p:grpSpPr>
+            <a:xfrm rot="2748745">
+              <a:off x="-152171" y="247236"/>
+              <a:ext cx="2068190" cy="1168705"/>
+              <a:chOff x="-2303824" y="498582"/>
+              <a:chExt cx="15095182" cy="6344117"/>
+            </a:xfrm>
+            <a:solidFill>
+              <a:schemeClr val="bg1"/>
+            </a:solidFill>
+            <a:effectLst/>
+          </p:grpSpPr>
+          <p:sp>
+            <p:nvSpPr>
+              <p:cNvPr id="4" name="Rectangle 3">
+                <a:extLst>
+                  <a:ext uri="{FF2B5EF4-FFF2-40B4-BE49-F238E27FC236}">
+                    <a16:creationId xmlns:a16="http://schemas.microsoft.com/office/drawing/2014/main" id="{ED4C6AF5-E0CD-4909-A091-D24C7B5ADFEC}"/>
+                  </a:ext>
+                </a:extLst>
+              </p:cNvPr>
+              <p:cNvSpPr/>
+              <p:nvPr/>
+            </p:nvSpPr>
+            <p:spPr>
+              <a:xfrm>
+                <a:off x="-2303824" y="1385404"/>
+                <a:ext cx="10543992" cy="4792136"/>
+              </a:xfrm>
+              <a:custGeom>
+                <a:avLst/>
+                <a:gdLst>
+                  <a:gd name="connsiteX0" fmla="*/ 0 w 1106961"/>
+                  <a:gd name="connsiteY0" fmla="*/ 0 h 882801"/>
+                  <a:gd name="connsiteX1" fmla="*/ 1106961 w 1106961"/>
+                  <a:gd name="connsiteY1" fmla="*/ 0 h 882801"/>
+                  <a:gd name="connsiteX2" fmla="*/ 1106961 w 1106961"/>
+                  <a:gd name="connsiteY2" fmla="*/ 882801 h 882801"/>
+                  <a:gd name="connsiteX3" fmla="*/ 0 w 1106961"/>
+                  <a:gd name="connsiteY3" fmla="*/ 882801 h 882801"/>
+                  <a:gd name="connsiteX4" fmla="*/ 0 w 1106961"/>
+                  <a:gd name="connsiteY4" fmla="*/ 0 h 882801"/>
+                  <a:gd name="connsiteX0" fmla="*/ 1596 w 1108557"/>
+                  <a:gd name="connsiteY0" fmla="*/ 0 h 882801"/>
+                  <a:gd name="connsiteX1" fmla="*/ 1108557 w 1108557"/>
+                  <a:gd name="connsiteY1" fmla="*/ 0 h 882801"/>
+                  <a:gd name="connsiteX2" fmla="*/ 1108557 w 1108557"/>
+                  <a:gd name="connsiteY2" fmla="*/ 882801 h 882801"/>
+                  <a:gd name="connsiteX3" fmla="*/ 1596 w 1108557"/>
+                  <a:gd name="connsiteY3" fmla="*/ 882801 h 882801"/>
+                  <a:gd name="connsiteX4" fmla="*/ 0 w 1108557"/>
+                  <a:gd name="connsiteY4" fmla="*/ 446987 h 882801"/>
+                  <a:gd name="connsiteX5" fmla="*/ 1596 w 1108557"/>
+                  <a:gd name="connsiteY5" fmla="*/ 0 h 882801"/>
+                  <a:gd name="connsiteX0" fmla="*/ 337671 w 1444632"/>
+                  <a:gd name="connsiteY0" fmla="*/ 0 h 882801"/>
+                  <a:gd name="connsiteX1" fmla="*/ 1444632 w 1444632"/>
+                  <a:gd name="connsiteY1" fmla="*/ 0 h 882801"/>
+                  <a:gd name="connsiteX2" fmla="*/ 1444632 w 1444632"/>
+                  <a:gd name="connsiteY2" fmla="*/ 882801 h 882801"/>
+                  <a:gd name="connsiteX3" fmla="*/ 337671 w 1444632"/>
+                  <a:gd name="connsiteY3" fmla="*/ 882801 h 882801"/>
+                  <a:gd name="connsiteX4" fmla="*/ 0 w 1444632"/>
+                  <a:gd name="connsiteY4" fmla="*/ 450046 h 882801"/>
+                  <a:gd name="connsiteX5" fmla="*/ 337671 w 1444632"/>
+                  <a:gd name="connsiteY5" fmla="*/ 0 h 882801"/>
+                </a:gdLst>
+                <a:ahLst/>
+                <a:cxnLst>
+                  <a:cxn ang="0">
+                    <a:pos x="connsiteX0" y="connsiteY0"/>
+                  </a:cxn>
+                  <a:cxn ang="0">
+                    <a:pos x="connsiteX1" y="connsiteY1"/>
+                  </a:cxn>
+                  <a:cxn ang="0">
+                    <a:pos x="connsiteX2" y="connsiteY2"/>
+                  </a:cxn>
+                  <a:cxn ang="0">
+                    <a:pos x="connsiteX3" y="connsiteY3"/>
+                  </a:cxn>
+                  <a:cxn ang="0">
+                    <a:pos x="connsiteX4" y="connsiteY4"/>
+                  </a:cxn>
+                  <a:cxn ang="0">
+                    <a:pos x="connsiteX5" y="connsiteY5"/>
+                  </a:cxn>
+                </a:cxnLst>
+                <a:rect l="l" t="t" r="r" b="b"/>
+                <a:pathLst>
+                  <a:path w="1444632" h="882801">
+                    <a:moveTo>
+                      <a:pt x="337671" y="0"/>
+                    </a:moveTo>
+                    <a:lnTo>
+                      <a:pt x="1444632" y="0"/>
+                    </a:lnTo>
+                    <a:lnTo>
+                      <a:pt x="1444632" y="882801"/>
+                    </a:lnTo>
+                    <a:lnTo>
+                      <a:pt x="337671" y="882801"/>
+                    </a:lnTo>
+                    <a:lnTo>
+                      <a:pt x="0" y="450046"/>
+                    </a:lnTo>
+                    <a:lnTo>
+                      <a:pt x="337671" y="0"/>
+                    </a:lnTo>
+                    <a:close/>
+                  </a:path>
+                </a:pathLst>
+              </a:custGeom>
+              <a:grpFill/>
+              <a:ln>
+                <a:noFill/>
+              </a:ln>
+            </p:spPr>
+            <p:style>
+              <a:lnRef idx="2">
+                <a:schemeClr val="accent1">
+                  <a:shade val="50000"/>
+                </a:schemeClr>
+              </a:lnRef>
+              <a:fillRef idx="1">
+                <a:schemeClr val="accent1"/>
+              </a:fillRef>
+              <a:effectRef idx="0">
+                <a:schemeClr val="accent1"/>
+              </a:effectRef>
+              <a:fontRef idx="minor">
+                <a:schemeClr val="lt1"/>
+              </a:fontRef>
+            </p:style>
+            <p:txBody>
+              <a:bodyPr rtlCol="0" anchor="ctr"/>
+              <a:lstStyle/>
+              <a:p>
+                <a:pPr algn="ctr"/>
+                <a:endParaRPr lang="en-AU" sz="100"/>
+              </a:p>
+            </p:txBody>
+          </p:sp>
+          <p:sp>
+            <p:nvSpPr>
+              <p:cNvPr id="5" name="Isosceles Triangle 4">
+                <a:extLst>
+                  <a:ext uri="{FF2B5EF4-FFF2-40B4-BE49-F238E27FC236}">
+                    <a16:creationId xmlns:a16="http://schemas.microsoft.com/office/drawing/2014/main" id="{6DBC495A-5066-41BB-9D6B-19616BA35479}"/>
+                  </a:ext>
+                </a:extLst>
+              </p:cNvPr>
+              <p:cNvSpPr/>
+              <p:nvPr/>
+            </p:nvSpPr>
+            <p:spPr>
+              <a:xfrm rot="5400000">
+                <a:off x="8295558" y="1676811"/>
+                <a:ext cx="4792137" cy="4199462"/>
+              </a:xfrm>
+              <a:prstGeom prst="triangle">
+                <a:avLst/>
+              </a:prstGeom>
+              <a:grpFill/>
+              <a:ln>
+                <a:noFill/>
+              </a:ln>
+            </p:spPr>
+            <p:style>
+              <a:lnRef idx="2">
+                <a:schemeClr val="accent1">
+                  <a:shade val="50000"/>
+                </a:schemeClr>
+              </a:lnRef>
+              <a:fillRef idx="1">
+                <a:schemeClr val="accent1"/>
+              </a:fillRef>
+              <a:effectRef idx="0">
+                <a:schemeClr val="accent1"/>
+              </a:effectRef>
+              <a:fontRef idx="minor">
+                <a:schemeClr val="lt1"/>
+              </a:fontRef>
+            </p:style>
+            <p:txBody>
+              <a:bodyPr rtlCol="0" anchor="ctr"/>
+              <a:lstStyle/>
+              <a:p>
+                <a:pPr algn="ctr"/>
+                <a:endParaRPr lang="en-AU" sz="100"/>
+              </a:p>
+            </p:txBody>
+          </p:sp>
+          <p:sp>
+            <p:nvSpPr>
+              <p:cNvPr id="6" name="Isosceles Triangle 5">
+                <a:extLst>
+                  <a:ext uri="{FF2B5EF4-FFF2-40B4-BE49-F238E27FC236}">
+                    <a16:creationId xmlns:a16="http://schemas.microsoft.com/office/drawing/2014/main" id="{50049509-024F-43EA-A614-2C31B6803B8F}"/>
+                  </a:ext>
+                </a:extLst>
+              </p:cNvPr>
+              <p:cNvSpPr/>
+              <p:nvPr/>
+            </p:nvSpPr>
+            <p:spPr>
+              <a:xfrm>
+                <a:off x="998771" y="498582"/>
+                <a:ext cx="2336385" cy="1173159"/>
+              </a:xfrm>
+              <a:prstGeom prst="triangle">
+                <a:avLst>
+                  <a:gd name="adj" fmla="val 5040"/>
+                </a:avLst>
+              </a:prstGeom>
+              <a:grpFill/>
+              <a:ln>
+                <a:noFill/>
+              </a:ln>
+            </p:spPr>
+            <p:style>
+              <a:lnRef idx="2">
+                <a:schemeClr val="accent1">
+                  <a:shade val="50000"/>
+                </a:schemeClr>
+              </a:lnRef>
+              <a:fillRef idx="1">
+                <a:schemeClr val="accent1"/>
+              </a:fillRef>
+              <a:effectRef idx="0">
+                <a:schemeClr val="accent1"/>
+              </a:effectRef>
+              <a:fontRef idx="minor">
+                <a:schemeClr val="lt1"/>
+              </a:fontRef>
+            </p:style>
+            <p:txBody>
+              <a:bodyPr rtlCol="0" anchor="ctr"/>
+              <a:lstStyle/>
+              <a:p>
+                <a:pPr algn="ctr"/>
+                <a:endParaRPr lang="en-AU" sz="100"/>
+              </a:p>
+            </p:txBody>
+          </p:sp>
+          <p:sp>
+            <p:nvSpPr>
+              <p:cNvPr id="7" name="Isosceles Triangle 6">
+                <a:extLst>
+                  <a:ext uri="{FF2B5EF4-FFF2-40B4-BE49-F238E27FC236}">
+                    <a16:creationId xmlns:a16="http://schemas.microsoft.com/office/drawing/2014/main" id="{09592E3D-F6C0-461B-8709-73F823E65EF4}"/>
+                  </a:ext>
+                </a:extLst>
+              </p:cNvPr>
+              <p:cNvSpPr/>
+              <p:nvPr/>
+            </p:nvSpPr>
+            <p:spPr>
+              <a:xfrm rot="10800000">
+                <a:off x="1009011" y="5923031"/>
+                <a:ext cx="1883593" cy="919668"/>
+              </a:xfrm>
+              <a:prstGeom prst="triangle">
+                <a:avLst>
+                  <a:gd name="adj" fmla="val 100000"/>
+                </a:avLst>
+              </a:prstGeom>
+              <a:grpFill/>
+              <a:ln>
+                <a:noFill/>
+              </a:ln>
+            </p:spPr>
+            <p:style>
+              <a:lnRef idx="2">
+                <a:schemeClr val="accent1">
+                  <a:shade val="50000"/>
+                </a:schemeClr>
+              </a:lnRef>
+              <a:fillRef idx="1">
+                <a:schemeClr val="accent1"/>
+              </a:fillRef>
+              <a:effectRef idx="0">
+                <a:schemeClr val="accent1"/>
+              </a:effectRef>
+              <a:fontRef idx="minor">
+                <a:schemeClr val="lt1"/>
+              </a:fontRef>
+            </p:style>
+            <p:txBody>
+              <a:bodyPr rtlCol="0" anchor="ctr"/>
+              <a:lstStyle/>
+              <a:p>
+                <a:pPr algn="ctr"/>
+                <a:endParaRPr lang="en-AU" sz="100"/>
+              </a:p>
+            </p:txBody>
+          </p:sp>
+        </p:grpSp>
+      </p:grpSp>
+    </p:spTree>
+    <p:extLst>
+      <p:ext uri="{BB962C8B-B14F-4D97-AF65-F5344CB8AC3E}">
+        <p14:creationId xmlns:p14="http://schemas.microsoft.com/office/powerpoint/2010/main" val="1237931564"/>
+      </p:ext>
+    </p:extLst>
+  </p:cSld>
+  <p:clrMapOvr>
+    <a:masterClrMapping/>
+  </p:clrMapOvr>
+</p:sld>
+</file>
+
+<file path=ppt/slides/slide4.xml><?xml version="1.0" encoding="utf-8"?>
+<p:sld xmlns:a="http://schemas.openxmlformats.org/drawingml/2006/main" xmlns:r="http://schemas.openxmlformats.org/officeDocument/2006/relationships" xmlns:p="http://schemas.openxmlformats.org/presentationml/2006/main">
+  <p:cSld>
+    <p:spTree>
+      <p:nvGrpSpPr>
+        <p:cNvPr id="1" name=""/>
+        <p:cNvGrpSpPr/>
+        <p:nvPr/>
+      </p:nvGrpSpPr>
+      <p:grpSpPr>
+        <a:xfrm>
+          <a:off x="0" y="0"/>
+          <a:ext cx="0" cy="0"/>
+          <a:chOff x="0" y="0"/>
+          <a:chExt cx="0" cy="0"/>
+        </a:xfrm>
+      </p:grpSpPr>
+      <p:grpSp>
+        <p:nvGrpSpPr>
           <p:cNvPr id="2" name="Group 1">
             <a:extLst>
               <a:ext uri="{FF2B5EF4-FFF2-40B4-BE49-F238E27FC236}">
@@ -3530,7 +4287,7 @@
 </p:sld>
 </file>
 
-<file path=ppt/slides/slide3.xml><?xml version="1.0" encoding="utf-8"?>
+<file path=ppt/slides/slide5.xml><?xml version="1.0" encoding="utf-8"?>
 <p:sld xmlns:a="http://schemas.openxmlformats.org/drawingml/2006/main" xmlns:r="http://schemas.openxmlformats.org/officeDocument/2006/relationships" xmlns:p="http://schemas.openxmlformats.org/presentationml/2006/main">
   <p:cSld>
     <p:spTree>
@@ -3867,7 +4624,7 @@
 </p:sld>
 </file>
 
-<file path=ppt/slides/slide4.xml><?xml version="1.0" encoding="utf-8"?>
+<file path=ppt/slides/slide6.xml><?xml version="1.0" encoding="utf-8"?>
 <p:sld xmlns:a="http://schemas.openxmlformats.org/drawingml/2006/main" xmlns:r="http://schemas.openxmlformats.org/officeDocument/2006/relationships" xmlns:p="http://schemas.openxmlformats.org/presentationml/2006/main">
   <p:cSld>
     <p:spTree>
@@ -4626,7 +5383,7 @@
 </p:sld>
 </file>
 
-<file path=ppt/slides/slide5.xml><?xml version="1.0" encoding="utf-8"?>
+<file path=ppt/slides/slide7.xml><?xml version="1.0" encoding="utf-8"?>
 <p:sld xmlns:a="http://schemas.openxmlformats.org/drawingml/2006/main" xmlns:r="http://schemas.openxmlformats.org/officeDocument/2006/relationships" xmlns:p="http://schemas.openxmlformats.org/presentationml/2006/main">
   <p:cSld>
     <p:spTree>
@@ -4787,7 +5544,7 @@
 </p:sld>
 </file>
 
-<file path=ppt/slides/slide6.xml><?xml version="1.0" encoding="utf-8"?>
+<file path=ppt/slides/slide8.xml><?xml version="1.0" encoding="utf-8"?>
 <p:sld xmlns:a="http://schemas.openxmlformats.org/drawingml/2006/main" xmlns:r="http://schemas.openxmlformats.org/officeDocument/2006/relationships" xmlns:p="http://schemas.openxmlformats.org/presentationml/2006/main">
   <p:cSld>
     <p:spTree>
@@ -4872,7 +5629,7 @@
 </p:sld>
 </file>
 
-<file path=ppt/slides/slide7.xml><?xml version="1.0" encoding="utf-8"?>
+<file path=ppt/slides/slide9.xml><?xml version="1.0" encoding="utf-8"?>
 <p:sld xmlns:a="http://schemas.openxmlformats.org/drawingml/2006/main" xmlns:r="http://schemas.openxmlformats.org/officeDocument/2006/relationships" xmlns:p="http://schemas.openxmlformats.org/presentationml/2006/main">
   <p:cSld>
     <p:spTree>

</xml_diff>